<commit_message>
Final Powerpoint; Final Test Cases; Test Cases pDF
</commit_message>
<xml_diff>
--- a/Documentation/Project_Powerpoint.pptx
+++ b/Documentation/Project_Powerpoint.pptx
@@ -4,6 +4,9 @@
   <p:sldMasterIdLst>
     <p:sldMasterId id="2147483660" r:id="rId4"/>
   </p:sldMasterIdLst>
+  <p:notesMasterIdLst>
+    <p:notesMasterId r:id="rId20"/>
+  </p:notesMasterIdLst>
   <p:sldIdLst>
     <p:sldId id="265" r:id="rId5"/>
     <p:sldId id="286" r:id="rId6"/>
@@ -12,12 +15,14 @@
     <p:sldId id="288" r:id="rId9"/>
     <p:sldId id="292" r:id="rId10"/>
     <p:sldId id="293" r:id="rId11"/>
-    <p:sldId id="294" r:id="rId12"/>
-    <p:sldId id="295" r:id="rId13"/>
-    <p:sldId id="296" r:id="rId14"/>
-    <p:sldId id="297" r:id="rId15"/>
-    <p:sldId id="298" r:id="rId16"/>
-    <p:sldId id="290" r:id="rId17"/>
+    <p:sldId id="299" r:id="rId12"/>
+    <p:sldId id="300" r:id="rId13"/>
+    <p:sldId id="294" r:id="rId14"/>
+    <p:sldId id="295" r:id="rId15"/>
+    <p:sldId id="296" r:id="rId16"/>
+    <p:sldId id="297" r:id="rId17"/>
+    <p:sldId id="298" r:id="rId18"/>
+    <p:sldId id="290" r:id="rId19"/>
   </p:sldIdLst>
   <p:sldSz cx="9144000" cy="5715000" type="screen16x10"/>
   <p:notesSz cx="6858000" cy="9144000"/>
@@ -124,6 +129,733 @@
 </p:presentation>
 </file>
 
+<file path=ppt/notesMasters/notesMaster1.xml><?xml version="1.0" encoding="utf-8"?>
+<p:notesMaster xmlns:a="http://schemas.openxmlformats.org/drawingml/2006/main" xmlns:r="http://schemas.openxmlformats.org/officeDocument/2006/relationships" xmlns:p="http://schemas.openxmlformats.org/presentationml/2006/main">
+  <p:cSld>
+    <p:bg>
+      <p:bgRef idx="1001">
+        <a:schemeClr val="bg1"/>
+      </p:bgRef>
+    </p:bg>
+    <p:spTree>
+      <p:nvGrpSpPr>
+        <p:cNvPr id="1" name=""/>
+        <p:cNvGrpSpPr/>
+        <p:nvPr/>
+      </p:nvGrpSpPr>
+      <p:grpSpPr>
+        <a:xfrm>
+          <a:off x="0" y="0"/>
+          <a:ext cx="0" cy="0"/>
+          <a:chOff x="0" y="0"/>
+          <a:chExt cx="0" cy="0"/>
+        </a:xfrm>
+      </p:grpSpPr>
+      <p:sp>
+        <p:nvSpPr>
+          <p:cNvPr id="2" name="Header Placeholder 1"/>
+          <p:cNvSpPr>
+            <a:spLocks noGrp="1"/>
+          </p:cNvSpPr>
+          <p:nvPr>
+            <p:ph type="hdr" sz="quarter"/>
+          </p:nvPr>
+        </p:nvSpPr>
+        <p:spPr>
+          <a:xfrm>
+            <a:off x="0" y="0"/>
+            <a:ext cx="2971800" cy="458788"/>
+          </a:xfrm>
+          <a:prstGeom prst="rect">
+            <a:avLst/>
+          </a:prstGeom>
+        </p:spPr>
+        <p:txBody>
+          <a:bodyPr vert="horz" lIns="91440" tIns="45720" rIns="91440" bIns="45720" rtlCol="0"/>
+          <a:lstStyle>
+            <a:lvl1pPr algn="l">
+              <a:defRPr sz="1200"/>
+            </a:lvl1pPr>
+          </a:lstStyle>
+          <a:p>
+            <a:endParaRPr lang="en-US"/>
+          </a:p>
+        </p:txBody>
+      </p:sp>
+      <p:sp>
+        <p:nvSpPr>
+          <p:cNvPr id="3" name="Date Placeholder 2"/>
+          <p:cNvSpPr>
+            <a:spLocks noGrp="1"/>
+          </p:cNvSpPr>
+          <p:nvPr>
+            <p:ph type="dt" idx="1"/>
+          </p:nvPr>
+        </p:nvSpPr>
+        <p:spPr>
+          <a:xfrm>
+            <a:off x="3884613" y="0"/>
+            <a:ext cx="2971800" cy="458788"/>
+          </a:xfrm>
+          <a:prstGeom prst="rect">
+            <a:avLst/>
+          </a:prstGeom>
+        </p:spPr>
+        <p:txBody>
+          <a:bodyPr vert="horz" lIns="91440" tIns="45720" rIns="91440" bIns="45720" rtlCol="0"/>
+          <a:lstStyle>
+            <a:lvl1pPr algn="r">
+              <a:defRPr sz="1200"/>
+            </a:lvl1pPr>
+          </a:lstStyle>
+          <a:p>
+            <a:fld id="{9DA4B682-8CDD-4AA7-81F8-AA218D78E886}" type="datetimeFigureOut">
+              <a:rPr lang="en-US" smtClean="0"/>
+              <a:t>4/16/2022</a:t>
+            </a:fld>
+            <a:endParaRPr lang="en-US"/>
+          </a:p>
+        </p:txBody>
+      </p:sp>
+      <p:sp>
+        <p:nvSpPr>
+          <p:cNvPr id="4" name="Slide Image Placeholder 3"/>
+          <p:cNvSpPr>
+            <a:spLocks noGrp="1" noRot="1" noChangeAspect="1"/>
+          </p:cNvSpPr>
+          <p:nvPr>
+            <p:ph type="sldImg" idx="2"/>
+          </p:nvPr>
+        </p:nvSpPr>
+        <p:spPr>
+          <a:xfrm>
+            <a:off x="960438" y="1143000"/>
+            <a:ext cx="4937125" cy="3086100"/>
+          </a:xfrm>
+          <a:prstGeom prst="rect">
+            <a:avLst/>
+          </a:prstGeom>
+          <a:noFill/>
+          <a:ln w="12700">
+            <a:solidFill>
+              <a:prstClr val="black"/>
+            </a:solidFill>
+          </a:ln>
+        </p:spPr>
+        <p:txBody>
+          <a:bodyPr vert="horz" lIns="91440" tIns="45720" rIns="91440" bIns="45720" rtlCol="0" anchor="ctr"/>
+          <a:lstStyle/>
+          <a:p>
+            <a:endParaRPr lang="en-US"/>
+          </a:p>
+        </p:txBody>
+      </p:sp>
+      <p:sp>
+        <p:nvSpPr>
+          <p:cNvPr id="5" name="Notes Placeholder 4"/>
+          <p:cNvSpPr>
+            <a:spLocks noGrp="1"/>
+          </p:cNvSpPr>
+          <p:nvPr>
+            <p:ph type="body" sz="quarter" idx="3"/>
+          </p:nvPr>
+        </p:nvSpPr>
+        <p:spPr>
+          <a:xfrm>
+            <a:off x="685800" y="4400550"/>
+            <a:ext cx="5486400" cy="3600450"/>
+          </a:xfrm>
+          <a:prstGeom prst="rect">
+            <a:avLst/>
+          </a:prstGeom>
+        </p:spPr>
+        <p:txBody>
+          <a:bodyPr vert="horz" lIns="91440" tIns="45720" rIns="91440" bIns="45720" rtlCol="0"/>
+          <a:lstStyle/>
+          <a:p>
+            <a:pPr lvl="0"/>
+            <a:r>
+              <a:rPr lang="en-US"/>
+              <a:t>Click to edit Master text styles</a:t>
+            </a:r>
+          </a:p>
+          <a:p>
+            <a:pPr lvl="1"/>
+            <a:r>
+              <a:rPr lang="en-US"/>
+              <a:t>Second level</a:t>
+            </a:r>
+          </a:p>
+          <a:p>
+            <a:pPr lvl="2"/>
+            <a:r>
+              <a:rPr lang="en-US"/>
+              <a:t>Third level</a:t>
+            </a:r>
+          </a:p>
+          <a:p>
+            <a:pPr lvl="3"/>
+            <a:r>
+              <a:rPr lang="en-US"/>
+              <a:t>Fourth level</a:t>
+            </a:r>
+          </a:p>
+          <a:p>
+            <a:pPr lvl="4"/>
+            <a:r>
+              <a:rPr lang="en-US"/>
+              <a:t>Fifth level</a:t>
+            </a:r>
+          </a:p>
+        </p:txBody>
+      </p:sp>
+      <p:sp>
+        <p:nvSpPr>
+          <p:cNvPr id="6" name="Footer Placeholder 5"/>
+          <p:cNvSpPr>
+            <a:spLocks noGrp="1"/>
+          </p:cNvSpPr>
+          <p:nvPr>
+            <p:ph type="ftr" sz="quarter" idx="4"/>
+          </p:nvPr>
+        </p:nvSpPr>
+        <p:spPr>
+          <a:xfrm>
+            <a:off x="0" y="8685213"/>
+            <a:ext cx="2971800" cy="458787"/>
+          </a:xfrm>
+          <a:prstGeom prst="rect">
+            <a:avLst/>
+          </a:prstGeom>
+        </p:spPr>
+        <p:txBody>
+          <a:bodyPr vert="horz" lIns="91440" tIns="45720" rIns="91440" bIns="45720" rtlCol="0" anchor="b"/>
+          <a:lstStyle>
+            <a:lvl1pPr algn="l">
+              <a:defRPr sz="1200"/>
+            </a:lvl1pPr>
+          </a:lstStyle>
+          <a:p>
+            <a:endParaRPr lang="en-US"/>
+          </a:p>
+        </p:txBody>
+      </p:sp>
+      <p:sp>
+        <p:nvSpPr>
+          <p:cNvPr id="7" name="Slide Number Placeholder 6"/>
+          <p:cNvSpPr>
+            <a:spLocks noGrp="1"/>
+          </p:cNvSpPr>
+          <p:nvPr>
+            <p:ph type="sldNum" sz="quarter" idx="5"/>
+          </p:nvPr>
+        </p:nvSpPr>
+        <p:spPr>
+          <a:xfrm>
+            <a:off x="3884613" y="8685213"/>
+            <a:ext cx="2971800" cy="458787"/>
+          </a:xfrm>
+          <a:prstGeom prst="rect">
+            <a:avLst/>
+          </a:prstGeom>
+        </p:spPr>
+        <p:txBody>
+          <a:bodyPr vert="horz" lIns="91440" tIns="45720" rIns="91440" bIns="45720" rtlCol="0" anchor="b"/>
+          <a:lstStyle>
+            <a:lvl1pPr algn="r">
+              <a:defRPr sz="1200"/>
+            </a:lvl1pPr>
+          </a:lstStyle>
+          <a:p>
+            <a:fld id="{611CACB3-5FFF-4DE8-97C7-1C75B40DC378}" type="slidenum">
+              <a:rPr lang="en-US" smtClean="0"/>
+              <a:t>‹#›</a:t>
+            </a:fld>
+            <a:endParaRPr lang="en-US"/>
+          </a:p>
+        </p:txBody>
+      </p:sp>
+    </p:spTree>
+    <p:extLst>
+      <p:ext uri="{BB962C8B-B14F-4D97-AF65-F5344CB8AC3E}">
+        <p14:creationId xmlns:p14="http://schemas.microsoft.com/office/powerpoint/2010/main" val="4231034200"/>
+      </p:ext>
+    </p:extLst>
+  </p:cSld>
+  <p:clrMap bg1="lt1" tx1="dk1" bg2="lt2" tx2="dk2" accent1="accent1" accent2="accent2" accent3="accent3" accent4="accent4" accent5="accent5" accent6="accent6" hlink="hlink" folHlink="folHlink"/>
+  <p:notesStyle>
+    <a:lvl1pPr marL="0" algn="l" defTabSz="914400" rtl="0" eaLnBrk="1" latinLnBrk="0" hangingPunct="1">
+      <a:defRPr sz="1200" kern="1200">
+        <a:solidFill>
+          <a:schemeClr val="tx1"/>
+        </a:solidFill>
+        <a:latin typeface="+mn-lt"/>
+        <a:ea typeface="+mn-ea"/>
+        <a:cs typeface="+mn-cs"/>
+      </a:defRPr>
+    </a:lvl1pPr>
+    <a:lvl2pPr marL="457200" algn="l" defTabSz="914400" rtl="0" eaLnBrk="1" latinLnBrk="0" hangingPunct="1">
+      <a:defRPr sz="1200" kern="1200">
+        <a:solidFill>
+          <a:schemeClr val="tx1"/>
+        </a:solidFill>
+        <a:latin typeface="+mn-lt"/>
+        <a:ea typeface="+mn-ea"/>
+        <a:cs typeface="+mn-cs"/>
+      </a:defRPr>
+    </a:lvl2pPr>
+    <a:lvl3pPr marL="914400" algn="l" defTabSz="914400" rtl="0" eaLnBrk="1" latinLnBrk="0" hangingPunct="1">
+      <a:defRPr sz="1200" kern="1200">
+        <a:solidFill>
+          <a:schemeClr val="tx1"/>
+        </a:solidFill>
+        <a:latin typeface="+mn-lt"/>
+        <a:ea typeface="+mn-ea"/>
+        <a:cs typeface="+mn-cs"/>
+      </a:defRPr>
+    </a:lvl3pPr>
+    <a:lvl4pPr marL="1371600" algn="l" defTabSz="914400" rtl="0" eaLnBrk="1" latinLnBrk="0" hangingPunct="1">
+      <a:defRPr sz="1200" kern="1200">
+        <a:solidFill>
+          <a:schemeClr val="tx1"/>
+        </a:solidFill>
+        <a:latin typeface="+mn-lt"/>
+        <a:ea typeface="+mn-ea"/>
+        <a:cs typeface="+mn-cs"/>
+      </a:defRPr>
+    </a:lvl4pPr>
+    <a:lvl5pPr marL="1828800" algn="l" defTabSz="914400" rtl="0" eaLnBrk="1" latinLnBrk="0" hangingPunct="1">
+      <a:defRPr sz="1200" kern="1200">
+        <a:solidFill>
+          <a:schemeClr val="tx1"/>
+        </a:solidFill>
+        <a:latin typeface="+mn-lt"/>
+        <a:ea typeface="+mn-ea"/>
+        <a:cs typeface="+mn-cs"/>
+      </a:defRPr>
+    </a:lvl5pPr>
+    <a:lvl6pPr marL="2286000" algn="l" defTabSz="914400" rtl="0" eaLnBrk="1" latinLnBrk="0" hangingPunct="1">
+      <a:defRPr sz="1200" kern="1200">
+        <a:solidFill>
+          <a:schemeClr val="tx1"/>
+        </a:solidFill>
+        <a:latin typeface="+mn-lt"/>
+        <a:ea typeface="+mn-ea"/>
+        <a:cs typeface="+mn-cs"/>
+      </a:defRPr>
+    </a:lvl6pPr>
+    <a:lvl7pPr marL="2743200" algn="l" defTabSz="914400" rtl="0" eaLnBrk="1" latinLnBrk="0" hangingPunct="1">
+      <a:defRPr sz="1200" kern="1200">
+        <a:solidFill>
+          <a:schemeClr val="tx1"/>
+        </a:solidFill>
+        <a:latin typeface="+mn-lt"/>
+        <a:ea typeface="+mn-ea"/>
+        <a:cs typeface="+mn-cs"/>
+      </a:defRPr>
+    </a:lvl7pPr>
+    <a:lvl8pPr marL="3200400" algn="l" defTabSz="914400" rtl="0" eaLnBrk="1" latinLnBrk="0" hangingPunct="1">
+      <a:defRPr sz="1200" kern="1200">
+        <a:solidFill>
+          <a:schemeClr val="tx1"/>
+        </a:solidFill>
+        <a:latin typeface="+mn-lt"/>
+        <a:ea typeface="+mn-ea"/>
+        <a:cs typeface="+mn-cs"/>
+      </a:defRPr>
+    </a:lvl8pPr>
+    <a:lvl9pPr marL="3657600" algn="l" defTabSz="914400" rtl="0" eaLnBrk="1" latinLnBrk="0" hangingPunct="1">
+      <a:defRPr sz="1200" kern="1200">
+        <a:solidFill>
+          <a:schemeClr val="tx1"/>
+        </a:solidFill>
+        <a:latin typeface="+mn-lt"/>
+        <a:ea typeface="+mn-ea"/>
+        <a:cs typeface="+mn-cs"/>
+      </a:defRPr>
+    </a:lvl9pPr>
+  </p:notesStyle>
+</p:notesMaster>
+</file>
+
+<file path=ppt/notesSlides/notesSlide1.xml><?xml version="1.0" encoding="utf-8"?>
+<p:notes xmlns:a="http://schemas.openxmlformats.org/drawingml/2006/main" xmlns:r="http://schemas.openxmlformats.org/officeDocument/2006/relationships" xmlns:p="http://schemas.openxmlformats.org/presentationml/2006/main">
+  <p:cSld>
+    <p:spTree>
+      <p:nvGrpSpPr>
+        <p:cNvPr id="1" name=""/>
+        <p:cNvGrpSpPr/>
+        <p:nvPr/>
+      </p:nvGrpSpPr>
+      <p:grpSpPr>
+        <a:xfrm>
+          <a:off x="0" y="0"/>
+          <a:ext cx="0" cy="0"/>
+          <a:chOff x="0" y="0"/>
+          <a:chExt cx="0" cy="0"/>
+        </a:xfrm>
+      </p:grpSpPr>
+      <p:sp>
+        <p:nvSpPr>
+          <p:cNvPr id="2" name="Slide Image Placeholder 1"/>
+          <p:cNvSpPr>
+            <a:spLocks noGrp="1" noRot="1" noChangeAspect="1"/>
+          </p:cNvSpPr>
+          <p:nvPr>
+            <p:ph type="sldImg"/>
+          </p:nvPr>
+        </p:nvSpPr>
+        <p:spPr/>
+      </p:sp>
+      <p:sp>
+        <p:nvSpPr>
+          <p:cNvPr id="3" name="Notes Placeholder 2"/>
+          <p:cNvSpPr>
+            <a:spLocks noGrp="1"/>
+          </p:cNvSpPr>
+          <p:nvPr>
+            <p:ph type="body" idx="1"/>
+          </p:nvPr>
+        </p:nvSpPr>
+        <p:spPr/>
+        <p:txBody>
+          <a:bodyPr/>
+          <a:lstStyle/>
+          <a:p>
+            <a:r>
+              <a:rPr lang="en-US" dirty="0"/>
+              <a:t>Benefits and detriments (don’t do a narrative)</a:t>
+            </a:r>
+          </a:p>
+        </p:txBody>
+      </p:sp>
+      <p:sp>
+        <p:nvSpPr>
+          <p:cNvPr id="4" name="Slide Number Placeholder 3"/>
+          <p:cNvSpPr>
+            <a:spLocks noGrp="1"/>
+          </p:cNvSpPr>
+          <p:nvPr>
+            <p:ph type="sldNum" sz="quarter" idx="5"/>
+          </p:nvPr>
+        </p:nvSpPr>
+        <p:spPr/>
+        <p:txBody>
+          <a:bodyPr/>
+          <a:lstStyle/>
+          <a:p>
+            <a:fld id="{611CACB3-5FFF-4DE8-97C7-1C75B40DC378}" type="slidenum">
+              <a:rPr lang="en-US" smtClean="0"/>
+              <a:t>4</a:t>
+            </a:fld>
+            <a:endParaRPr lang="en-US"/>
+          </a:p>
+        </p:txBody>
+      </p:sp>
+    </p:spTree>
+    <p:extLst>
+      <p:ext uri="{BB962C8B-B14F-4D97-AF65-F5344CB8AC3E}">
+        <p14:creationId xmlns:p14="http://schemas.microsoft.com/office/powerpoint/2010/main" val="818718786"/>
+      </p:ext>
+    </p:extLst>
+  </p:cSld>
+  <p:clrMapOvr>
+    <a:masterClrMapping/>
+  </p:clrMapOvr>
+</p:notes>
+</file>
+
+<file path=ppt/notesSlides/notesSlide2.xml><?xml version="1.0" encoding="utf-8"?>
+<p:notes xmlns:a="http://schemas.openxmlformats.org/drawingml/2006/main" xmlns:r="http://schemas.openxmlformats.org/officeDocument/2006/relationships" xmlns:p="http://schemas.openxmlformats.org/presentationml/2006/main">
+  <p:cSld>
+    <p:spTree>
+      <p:nvGrpSpPr>
+        <p:cNvPr id="1" name=""/>
+        <p:cNvGrpSpPr/>
+        <p:nvPr/>
+      </p:nvGrpSpPr>
+      <p:grpSpPr>
+        <a:xfrm>
+          <a:off x="0" y="0"/>
+          <a:ext cx="0" cy="0"/>
+          <a:chOff x="0" y="0"/>
+          <a:chExt cx="0" cy="0"/>
+        </a:xfrm>
+      </p:grpSpPr>
+      <p:sp>
+        <p:nvSpPr>
+          <p:cNvPr id="2" name="Slide Image Placeholder 1"/>
+          <p:cNvSpPr>
+            <a:spLocks noGrp="1" noRot="1" noChangeAspect="1"/>
+          </p:cNvSpPr>
+          <p:nvPr>
+            <p:ph type="sldImg"/>
+          </p:nvPr>
+        </p:nvSpPr>
+        <p:spPr/>
+      </p:sp>
+      <p:sp>
+        <p:nvSpPr>
+          <p:cNvPr id="3" name="Notes Placeholder 2"/>
+          <p:cNvSpPr>
+            <a:spLocks noGrp="1"/>
+          </p:cNvSpPr>
+          <p:nvPr>
+            <p:ph type="body" idx="1"/>
+          </p:nvPr>
+        </p:nvSpPr>
+        <p:spPr/>
+        <p:txBody>
+          <a:bodyPr/>
+          <a:lstStyle/>
+          <a:p>
+            <a:r>
+              <a:rPr lang="en-US" dirty="0"/>
+              <a:t>Spend little time on this</a:t>
+            </a:r>
+          </a:p>
+        </p:txBody>
+      </p:sp>
+      <p:sp>
+        <p:nvSpPr>
+          <p:cNvPr id="4" name="Slide Number Placeholder 3"/>
+          <p:cNvSpPr>
+            <a:spLocks noGrp="1"/>
+          </p:cNvSpPr>
+          <p:nvPr>
+            <p:ph type="sldNum" sz="quarter" idx="5"/>
+          </p:nvPr>
+        </p:nvSpPr>
+        <p:spPr/>
+        <p:txBody>
+          <a:bodyPr/>
+          <a:lstStyle/>
+          <a:p>
+            <a:fld id="{611CACB3-5FFF-4DE8-97C7-1C75B40DC378}" type="slidenum">
+              <a:rPr lang="en-US" smtClean="0"/>
+              <a:t>5</a:t>
+            </a:fld>
+            <a:endParaRPr lang="en-US"/>
+          </a:p>
+        </p:txBody>
+      </p:sp>
+    </p:spTree>
+    <p:extLst>
+      <p:ext uri="{BB962C8B-B14F-4D97-AF65-F5344CB8AC3E}">
+        <p14:creationId xmlns:p14="http://schemas.microsoft.com/office/powerpoint/2010/main" val="180590714"/>
+      </p:ext>
+    </p:extLst>
+  </p:cSld>
+  <p:clrMapOvr>
+    <a:masterClrMapping/>
+  </p:clrMapOvr>
+</p:notes>
+</file>
+
+<file path=ppt/notesSlides/notesSlide3.xml><?xml version="1.0" encoding="utf-8"?>
+<p:notes xmlns:a="http://schemas.openxmlformats.org/drawingml/2006/main" xmlns:r="http://schemas.openxmlformats.org/officeDocument/2006/relationships" xmlns:p="http://schemas.openxmlformats.org/presentationml/2006/main">
+  <p:cSld>
+    <p:spTree>
+      <p:nvGrpSpPr>
+        <p:cNvPr id="1" name=""/>
+        <p:cNvGrpSpPr/>
+        <p:nvPr/>
+      </p:nvGrpSpPr>
+      <p:grpSpPr>
+        <a:xfrm>
+          <a:off x="0" y="0"/>
+          <a:ext cx="0" cy="0"/>
+          <a:chOff x="0" y="0"/>
+          <a:chExt cx="0" cy="0"/>
+        </a:xfrm>
+      </p:grpSpPr>
+      <p:sp>
+        <p:nvSpPr>
+          <p:cNvPr id="2" name="Slide Image Placeholder 1"/>
+          <p:cNvSpPr>
+            <a:spLocks noGrp="1" noRot="1" noChangeAspect="1"/>
+          </p:cNvSpPr>
+          <p:nvPr>
+            <p:ph type="sldImg"/>
+          </p:nvPr>
+        </p:nvSpPr>
+        <p:spPr/>
+      </p:sp>
+      <p:sp>
+        <p:nvSpPr>
+          <p:cNvPr id="3" name="Notes Placeholder 2"/>
+          <p:cNvSpPr>
+            <a:spLocks noGrp="1"/>
+          </p:cNvSpPr>
+          <p:nvPr>
+            <p:ph type="body" idx="1"/>
+          </p:nvPr>
+        </p:nvSpPr>
+        <p:spPr/>
+        <p:txBody>
+          <a:bodyPr/>
+          <a:lstStyle/>
+          <a:p>
+            <a:r>
+              <a:rPr lang="en-US" dirty="0"/>
+              <a:t>Spend little time. Note documentation.</a:t>
+            </a:r>
+          </a:p>
+        </p:txBody>
+      </p:sp>
+      <p:sp>
+        <p:nvSpPr>
+          <p:cNvPr id="4" name="Slide Number Placeholder 3"/>
+          <p:cNvSpPr>
+            <a:spLocks noGrp="1"/>
+          </p:cNvSpPr>
+          <p:nvPr>
+            <p:ph type="sldNum" sz="quarter" idx="5"/>
+          </p:nvPr>
+        </p:nvSpPr>
+        <p:spPr/>
+        <p:txBody>
+          <a:bodyPr/>
+          <a:lstStyle/>
+          <a:p>
+            <a:fld id="{611CACB3-5FFF-4DE8-97C7-1C75B40DC378}" type="slidenum">
+              <a:rPr lang="en-US" smtClean="0"/>
+              <a:t>6</a:t>
+            </a:fld>
+            <a:endParaRPr lang="en-US"/>
+          </a:p>
+        </p:txBody>
+      </p:sp>
+    </p:spTree>
+    <p:extLst>
+      <p:ext uri="{BB962C8B-B14F-4D97-AF65-F5344CB8AC3E}">
+        <p14:creationId xmlns:p14="http://schemas.microsoft.com/office/powerpoint/2010/main" val="415703412"/>
+      </p:ext>
+    </p:extLst>
+  </p:cSld>
+  <p:clrMapOvr>
+    <a:masterClrMapping/>
+  </p:clrMapOvr>
+</p:notes>
+</file>
+
+<file path=ppt/notesSlides/notesSlide4.xml><?xml version="1.0" encoding="utf-8"?>
+<p:notes xmlns:a="http://schemas.openxmlformats.org/drawingml/2006/main" xmlns:r="http://schemas.openxmlformats.org/officeDocument/2006/relationships" xmlns:p="http://schemas.openxmlformats.org/presentationml/2006/main">
+  <p:cSld>
+    <p:spTree>
+      <p:nvGrpSpPr>
+        <p:cNvPr id="1" name=""/>
+        <p:cNvGrpSpPr/>
+        <p:nvPr/>
+      </p:nvGrpSpPr>
+      <p:grpSpPr>
+        <a:xfrm>
+          <a:off x="0" y="0"/>
+          <a:ext cx="0" cy="0"/>
+          <a:chOff x="0" y="0"/>
+          <a:chExt cx="0" cy="0"/>
+        </a:xfrm>
+      </p:grpSpPr>
+      <p:sp>
+        <p:nvSpPr>
+          <p:cNvPr id="2" name="Slide Image Placeholder 1"/>
+          <p:cNvSpPr>
+            <a:spLocks noGrp="1" noRot="1" noChangeAspect="1"/>
+          </p:cNvSpPr>
+          <p:nvPr>
+            <p:ph type="sldImg"/>
+          </p:nvPr>
+        </p:nvSpPr>
+        <p:spPr/>
+      </p:sp>
+      <p:sp>
+        <p:nvSpPr>
+          <p:cNvPr id="3" name="Notes Placeholder 2"/>
+          <p:cNvSpPr>
+            <a:spLocks noGrp="1"/>
+          </p:cNvSpPr>
+          <p:nvPr>
+            <p:ph type="body" idx="1"/>
+          </p:nvPr>
+        </p:nvSpPr>
+        <p:spPr/>
+        <p:txBody>
+          <a:bodyPr/>
+          <a:lstStyle/>
+          <a:p>
+            <a:pPr marL="228600" indent="-228600">
+              <a:buAutoNum type="arabicPeriod"/>
+            </a:pPr>
+            <a:r>
+              <a:rPr lang="en-US" dirty="0"/>
+              <a:t>Load from PDF – Test.pdf (MAKE SURE TO SHOW IF PDF CAN’T BE FOUND)</a:t>
+            </a:r>
+          </a:p>
+          <a:p>
+            <a:pPr marL="228600" indent="-228600">
+              <a:buAutoNum type="arabicPeriod"/>
+            </a:pPr>
+            <a:r>
+              <a:rPr lang="en-US" dirty="0"/>
+              <a:t>Edit a statistic</a:t>
+            </a:r>
+          </a:p>
+          <a:p>
+            <a:pPr marL="228600" indent="-228600">
+              <a:buAutoNum type="arabicPeriod"/>
+            </a:pPr>
+            <a:r>
+              <a:rPr lang="en-US" dirty="0"/>
+              <a:t>View the character</a:t>
+            </a:r>
+          </a:p>
+          <a:p>
+            <a:pPr marL="228600" indent="-228600">
+              <a:buAutoNum type="arabicPeriod"/>
+            </a:pPr>
+            <a:r>
+              <a:rPr lang="en-US"/>
+              <a:t>Restart program to show it is saved</a:t>
+            </a:r>
+          </a:p>
+        </p:txBody>
+      </p:sp>
+      <p:sp>
+        <p:nvSpPr>
+          <p:cNvPr id="4" name="Slide Number Placeholder 3"/>
+          <p:cNvSpPr>
+            <a:spLocks noGrp="1"/>
+          </p:cNvSpPr>
+          <p:nvPr>
+            <p:ph type="sldNum" sz="quarter" idx="5"/>
+          </p:nvPr>
+        </p:nvSpPr>
+        <p:spPr/>
+        <p:txBody>
+          <a:bodyPr/>
+          <a:lstStyle/>
+          <a:p>
+            <a:fld id="{611CACB3-5FFF-4DE8-97C7-1C75B40DC378}" type="slidenum">
+              <a:rPr lang="en-US" smtClean="0"/>
+              <a:t>7</a:t>
+            </a:fld>
+            <a:endParaRPr lang="en-US"/>
+          </a:p>
+        </p:txBody>
+      </p:sp>
+    </p:spTree>
+    <p:extLst>
+      <p:ext uri="{BB962C8B-B14F-4D97-AF65-F5344CB8AC3E}">
+        <p14:creationId xmlns:p14="http://schemas.microsoft.com/office/powerpoint/2010/main" val="3320056167"/>
+      </p:ext>
+    </p:extLst>
+  </p:cSld>
+  <p:clrMapOvr>
+    <a:masterClrMapping/>
+  </p:clrMapOvr>
+</p:notes>
+</file>
+
 <file path=ppt/slideLayouts/slideLayout1.xml><?xml version="1.0" encoding="utf-8"?>
 <p:sldLayout xmlns:a="http://schemas.openxmlformats.org/drawingml/2006/main" xmlns:r="http://schemas.openxmlformats.org/officeDocument/2006/relationships" xmlns:p="http://schemas.openxmlformats.org/presentationml/2006/main" showMasterSp="0" type="title" preserve="1">
   <p:cSld name="Title Slide">
@@ -368,7 +1100,7 @@
           <a:p>
             <a:fld id="{9184DA70-C731-4C70-880D-CCD4705E623C}" type="datetime1">
               <a:rPr lang="en-US" smtClean="0"/>
-              <a:t>14-Apr-22</a:t>
+              <a:t>4/16/2022</a:t>
             </a:fld>
             <a:endParaRPr lang="en-US" dirty="0"/>
           </a:p>
@@ -556,7 +1288,7 @@
           <a:p>
             <a:fld id="{4BE1D723-8F53-4F53-90B0-1982A396982E}" type="datetime1">
               <a:rPr lang="en-US" smtClean="0"/>
-              <a:t>14-Apr-22</a:t>
+              <a:t>4/16/2022</a:t>
             </a:fld>
             <a:endParaRPr lang="en-US" dirty="0"/>
           </a:p>
@@ -929,7 +1661,7 @@
           <a:p>
             <a:fld id="{97669AF7-7BEB-44E4-9852-375E34362B5B}" type="datetime1">
               <a:rPr lang="en-US" smtClean="0"/>
-              <a:t>14-Apr-22</a:t>
+              <a:t>4/16/2022</a:t>
             </a:fld>
             <a:endParaRPr lang="en-US" dirty="0"/>
           </a:p>
@@ -1184,7 +1916,7 @@
           <a:p>
             <a:fld id="{BAAAC38D-0552-4C82-B593-E6124DFADBE2}" type="datetime1">
               <a:rPr lang="en-US" smtClean="0"/>
-              <a:t>14-Apr-22</a:t>
+              <a:t>4/16/2022</a:t>
             </a:fld>
             <a:endParaRPr lang="en-US" dirty="0"/>
           </a:p>
@@ -1581,7 +2313,7 @@
           <a:p>
             <a:fld id="{D9DF0F1C-5577-4ACB-BB62-DF8F3C494C7E}" type="datetime1">
               <a:rPr lang="en-US" smtClean="0"/>
-              <a:t>14-Apr-22</a:t>
+              <a:t>4/16/2022</a:t>
             </a:fld>
             <a:endParaRPr lang="en-US" dirty="0"/>
           </a:p>
@@ -1717,7 +2449,7 @@
           <a:p>
             <a:fld id="{1775B394-D9F9-4F0C-B15D-605F45CB9E9F}" type="datetime1">
               <a:rPr lang="en-US" smtClean="0"/>
-              <a:t>14-Apr-22</a:t>
+              <a:t>4/16/2022</a:t>
             </a:fld>
             <a:endParaRPr lang="en-US" dirty="0"/>
           </a:p>
@@ -1874,7 +2606,7 @@
           <a:p>
             <a:fld id="{39667345-2558-425A-8533-9BFDBCE15005}" type="datetime1">
               <a:rPr lang="en-US" smtClean="0"/>
-              <a:t>14-Apr-22</a:t>
+              <a:t>4/16/2022</a:t>
             </a:fld>
             <a:endParaRPr lang="en-US" dirty="0"/>
           </a:p>
@@ -2203,7 +2935,7 @@
           <a:p>
             <a:fld id="{92BEA474-078D-4E9B-9B14-09A87B19DC46}" type="datetime1">
               <a:rPr lang="en-US" smtClean="0"/>
-              <a:t>14-Apr-22</a:t>
+              <a:t>4/16/2022</a:t>
             </a:fld>
             <a:endParaRPr lang="en-US" dirty="0"/>
           </a:p>
@@ -2553,7 +3285,7 @@
           <a:p>
             <a:fld id="{4907D986-8816-4272-A432-0437A28A9828}" type="datetime1">
               <a:rPr lang="en-US" smtClean="0"/>
-              <a:t>14-Apr-22</a:t>
+              <a:t>4/16/2022</a:t>
             </a:fld>
             <a:endParaRPr lang="en-US" dirty="0"/>
           </a:p>
@@ -2814,7 +3546,7 @@
           <a:p>
             <a:fld id="{62D6E202-B606-4609-B914-27C9371A1F6D}" type="datetime1">
               <a:rPr lang="en-US" smtClean="0"/>
-              <a:t>14-Apr-22</a:t>
+              <a:t>4/16/2022</a:t>
             </a:fld>
             <a:endParaRPr lang="en-US" dirty="0"/>
           </a:p>
@@ -3746,7 +4478,7 @@
           <p:cNvPr id="2" name="Title 1">
             <a:extLst>
               <a:ext uri="{FF2B5EF4-FFF2-40B4-BE49-F238E27FC236}">
-                <a16:creationId xmlns:a16="http://schemas.microsoft.com/office/drawing/2014/main" id="{ECFE24AC-7B66-442E-8BBB-051A6E74F9C8}"/>
+                <a16:creationId xmlns:a16="http://schemas.microsoft.com/office/drawing/2014/main" id="{26ABC4EC-BB79-460A-B116-B22342F3AD3A}"/>
               </a:ext>
             </a:extLst>
           </p:cNvPr>
@@ -3764,7 +4496,7 @@
           <a:p>
             <a:r>
               <a:rPr lang="en-US" dirty="0"/>
-              <a:t>Challenges Overcome</a:t>
+              <a:t>High-Level Test Plan</a:t>
             </a:r>
           </a:p>
         </p:txBody>
@@ -3774,7 +4506,7 @@
           <p:cNvPr id="3" name="Content Placeholder 2">
             <a:extLst>
               <a:ext uri="{FF2B5EF4-FFF2-40B4-BE49-F238E27FC236}">
-                <a16:creationId xmlns:a16="http://schemas.microsoft.com/office/drawing/2014/main" id="{486CF8A9-C7F7-48C2-BC06-41411197C982}"/>
+                <a16:creationId xmlns:a16="http://schemas.microsoft.com/office/drawing/2014/main" id="{A14C94AA-6CF4-438C-AAE0-D0E7197EE72E}"/>
               </a:ext>
             </a:extLst>
           </p:cNvPr>
@@ -3787,7 +4519,9 @@
         </p:nvSpPr>
         <p:spPr/>
         <p:txBody>
-          <a:bodyPr/>
+          <a:bodyPr>
+            <a:normAutofit/>
+          </a:bodyPr>
           <a:lstStyle/>
           <a:p>
             <a:pPr>
@@ -3795,12 +4529,8 @@
               <a:buChar char="•"/>
             </a:pPr>
             <a:r>
-              <a:rPr lang="en-US" dirty="0"/>
-              <a:t> </a:t>
-            </a:r>
-            <a:r>
               <a:rPr lang="en-US" sz="1800" dirty="0"/>
-              <a:t>Language decisions and implementation method</a:t>
+              <a:t> Ensure the product can run on the specified hardware without interruption</a:t>
             </a:r>
           </a:p>
           <a:p>
@@ -3810,7 +4540,47 @@
             </a:pPr>
             <a:r>
               <a:rPr lang="en-US" sz="1800" dirty="0"/>
-              <a:t> Interacting with a PDF</a:t>
+              <a:t> Ensure each functional requirement is met</a:t>
+            </a:r>
+          </a:p>
+          <a:p>
+            <a:pPr lvl="1">
+              <a:buFont typeface="Arial" panose="020B0604020202020204" pitchFamily="34" charset="0"/>
+              <a:buChar char="•"/>
+            </a:pPr>
+            <a:r>
+              <a:rPr lang="en-US" sz="1800" dirty="0"/>
+              <a:t>Data viewing</a:t>
+            </a:r>
+          </a:p>
+          <a:p>
+            <a:pPr lvl="1">
+              <a:buFont typeface="Arial" panose="020B0604020202020204" pitchFamily="34" charset="0"/>
+              <a:buChar char="•"/>
+            </a:pPr>
+            <a:r>
+              <a:rPr lang="en-US" sz="1800" dirty="0"/>
+              <a:t>Data creation</a:t>
+            </a:r>
+          </a:p>
+          <a:p>
+            <a:pPr lvl="1">
+              <a:buFont typeface="Arial" panose="020B0604020202020204" pitchFamily="34" charset="0"/>
+              <a:buChar char="•"/>
+            </a:pPr>
+            <a:r>
+              <a:rPr lang="en-US" sz="1800" dirty="0"/>
+              <a:t>Data storage</a:t>
+            </a:r>
+          </a:p>
+          <a:p>
+            <a:pPr lvl="1">
+              <a:buFont typeface="Arial" panose="020B0604020202020204" pitchFamily="34" charset="0"/>
+              <a:buChar char="•"/>
+            </a:pPr>
+            <a:r>
+              <a:rPr lang="en-US" sz="1800" dirty="0"/>
+              <a:t>Data editing</a:t>
             </a:r>
           </a:p>
           <a:p>
@@ -3820,7 +4590,7 @@
             </a:pPr>
             <a:r>
               <a:rPr lang="en-US" sz="1800" dirty="0"/>
-              <a:t> Understanding program to database interaction</a:t>
+              <a:t> Ensure input validation to prevent improper data entry</a:t>
             </a:r>
           </a:p>
           <a:p>
@@ -3830,7 +4600,7 @@
             </a:pPr>
             <a:r>
               <a:rPr lang="en-US" sz="1800" dirty="0"/>
-              <a:t> How to properly write documentation</a:t>
+              <a:t> Ensure integrity of the database</a:t>
             </a:r>
           </a:p>
         </p:txBody>
@@ -3838,7 +4608,7 @@
     </p:spTree>
     <p:extLst>
       <p:ext uri="{BB962C8B-B14F-4D97-AF65-F5344CB8AC3E}">
-        <p14:creationId xmlns:p14="http://schemas.microsoft.com/office/powerpoint/2010/main" val="1537991812"/>
+        <p14:creationId xmlns:p14="http://schemas.microsoft.com/office/powerpoint/2010/main" val="3173310127"/>
       </p:ext>
     </p:extLst>
   </p:cSld>
@@ -3870,7 +4640,7 @@
           <p:cNvPr id="2" name="Title 1">
             <a:extLst>
               <a:ext uri="{FF2B5EF4-FFF2-40B4-BE49-F238E27FC236}">
-                <a16:creationId xmlns:a16="http://schemas.microsoft.com/office/drawing/2014/main" id="{981D0141-348B-4BBA-B9CC-5693B0753355}"/>
+                <a16:creationId xmlns:a16="http://schemas.microsoft.com/office/drawing/2014/main" id="{43927D3B-E43C-4A7C-A5B5-0CC73CFFDEF6}"/>
               </a:ext>
             </a:extLst>
           </p:cNvPr>
@@ -3888,7 +4658,7 @@
           <a:p>
             <a:r>
               <a:rPr lang="en-US" dirty="0"/>
-              <a:t>Challenges Not Overcome</a:t>
+              <a:t>Test Results</a:t>
             </a:r>
           </a:p>
         </p:txBody>
@@ -3898,7 +4668,7 @@
           <p:cNvPr id="3" name="Content Placeholder 2">
             <a:extLst>
               <a:ext uri="{FF2B5EF4-FFF2-40B4-BE49-F238E27FC236}">
-                <a16:creationId xmlns:a16="http://schemas.microsoft.com/office/drawing/2014/main" id="{E41F6CB3-2222-42D2-B950-15729954AF84}"/>
+                <a16:creationId xmlns:a16="http://schemas.microsoft.com/office/drawing/2014/main" id="{3E42D5C9-29FC-42DF-84EF-5E42DF94DC75}"/>
               </a:ext>
             </a:extLst>
           </p:cNvPr>
@@ -3911,7 +4681,9 @@
         </p:nvSpPr>
         <p:spPr/>
         <p:txBody>
-          <a:bodyPr/>
+          <a:bodyPr>
+            <a:normAutofit fontScale="92500" lnSpcReduction="20000"/>
+          </a:bodyPr>
           <a:lstStyle/>
           <a:p>
             <a:pPr>
@@ -3919,12 +4691,18 @@
               <a:buChar char="•"/>
             </a:pPr>
             <a:r>
-              <a:rPr lang="en-US" dirty="0"/>
-              <a:t> </a:t>
-            </a:r>
-            <a:r>
               <a:rPr lang="en-US" sz="1800" dirty="0"/>
-              <a:t>Time constraints and full implementation</a:t>
+              <a:t>Project runtime performance</a:t>
+            </a:r>
+          </a:p>
+          <a:p>
+            <a:pPr lvl="1">
+              <a:buFont typeface="Arial" panose="020B0604020202020204" pitchFamily="34" charset="0"/>
+              <a:buChar char="•"/>
+            </a:pPr>
+            <a:r>
+              <a:rPr lang="en-US" sz="1800" dirty="0"/>
+              <a:t>While running with only 1 thread, no performance issues were detected</a:t>
             </a:r>
           </a:p>
           <a:p>
@@ -3934,7 +4712,47 @@
             </a:pPr>
             <a:r>
               <a:rPr lang="en-US" sz="1800" dirty="0"/>
-              <a:t> Utilizing a fully graphical user interface</a:t>
+              <a:t> Functional requirement testing</a:t>
+            </a:r>
+          </a:p>
+          <a:p>
+            <a:pPr lvl="1">
+              <a:buFont typeface="Arial" panose="020B0604020202020204" pitchFamily="34" charset="0"/>
+              <a:buChar char="•"/>
+            </a:pPr>
+            <a:r>
+              <a:rPr lang="en-US" sz="1800" dirty="0"/>
+              <a:t>Data viewing – The data is displayed accurately and without error</a:t>
+            </a:r>
+          </a:p>
+          <a:p>
+            <a:pPr lvl="1">
+              <a:buFont typeface="Arial" panose="020B0604020202020204" pitchFamily="34" charset="0"/>
+              <a:buChar char="•"/>
+            </a:pPr>
+            <a:r>
+              <a:rPr lang="en-US" sz="1800" dirty="0"/>
+              <a:t>Data creation – The data is created without improper input</a:t>
+            </a:r>
+          </a:p>
+          <a:p>
+            <a:pPr lvl="1">
+              <a:buFont typeface="Arial" panose="020B0604020202020204" pitchFamily="34" charset="0"/>
+              <a:buChar char="•"/>
+            </a:pPr>
+            <a:r>
+              <a:rPr lang="en-US" sz="1800" dirty="0"/>
+              <a:t>Data editing – The data is able to be edited without improper input</a:t>
+            </a:r>
+          </a:p>
+          <a:p>
+            <a:pPr lvl="1">
+              <a:buFont typeface="Arial" panose="020B0604020202020204" pitchFamily="34" charset="0"/>
+              <a:buChar char="•"/>
+            </a:pPr>
+            <a:r>
+              <a:rPr lang="en-US" sz="1800" dirty="0"/>
+              <a:t>Data saving/loading – The data is able to be saved and loaded from the database file</a:t>
             </a:r>
           </a:p>
           <a:p>
@@ -3944,7 +4762,17 @@
             </a:pPr>
             <a:r>
               <a:rPr lang="en-US" sz="1800" dirty="0"/>
-              <a:t> Implementing a way to interpret Dungeons and Dragons spells and abilities</a:t>
+              <a:t> Graphical user interface</a:t>
+            </a:r>
+          </a:p>
+          <a:p>
+            <a:pPr lvl="1">
+              <a:buFont typeface="Arial" panose="020B0604020202020204" pitchFamily="34" charset="0"/>
+              <a:buChar char="•"/>
+            </a:pPr>
+            <a:r>
+              <a:rPr lang="en-US" sz="1800" dirty="0"/>
+              <a:t>No graphical user interface was implemented</a:t>
             </a:r>
           </a:p>
         </p:txBody>
@@ -3952,7 +4780,7 @@
     </p:spTree>
     <p:extLst>
       <p:ext uri="{BB962C8B-B14F-4D97-AF65-F5344CB8AC3E}">
-        <p14:creationId xmlns:p14="http://schemas.microsoft.com/office/powerpoint/2010/main" val="2164835738"/>
+        <p14:creationId xmlns:p14="http://schemas.microsoft.com/office/powerpoint/2010/main" val="1090579756"/>
       </p:ext>
     </p:extLst>
   </p:cSld>
@@ -3984,6 +4812,244 @@
           <p:cNvPr id="2" name="Title 1">
             <a:extLst>
               <a:ext uri="{FF2B5EF4-FFF2-40B4-BE49-F238E27FC236}">
+                <a16:creationId xmlns:a16="http://schemas.microsoft.com/office/drawing/2014/main" id="{ECFE24AC-7B66-442E-8BBB-051A6E74F9C8}"/>
+              </a:ext>
+            </a:extLst>
+          </p:cNvPr>
+          <p:cNvSpPr>
+            <a:spLocks noGrp="1"/>
+          </p:cNvSpPr>
+          <p:nvPr>
+            <p:ph type="title"/>
+          </p:nvPr>
+        </p:nvSpPr>
+        <p:spPr/>
+        <p:txBody>
+          <a:bodyPr/>
+          <a:lstStyle/>
+          <a:p>
+            <a:r>
+              <a:rPr lang="en-US" dirty="0"/>
+              <a:t>Challenges Overcome</a:t>
+            </a:r>
+          </a:p>
+        </p:txBody>
+      </p:sp>
+      <p:sp>
+        <p:nvSpPr>
+          <p:cNvPr id="3" name="Content Placeholder 2">
+            <a:extLst>
+              <a:ext uri="{FF2B5EF4-FFF2-40B4-BE49-F238E27FC236}">
+                <a16:creationId xmlns:a16="http://schemas.microsoft.com/office/drawing/2014/main" id="{486CF8A9-C7F7-48C2-BC06-41411197C982}"/>
+              </a:ext>
+            </a:extLst>
+          </p:cNvPr>
+          <p:cNvSpPr>
+            <a:spLocks noGrp="1"/>
+          </p:cNvSpPr>
+          <p:nvPr>
+            <p:ph idx="1"/>
+          </p:nvPr>
+        </p:nvSpPr>
+        <p:spPr/>
+        <p:txBody>
+          <a:bodyPr/>
+          <a:lstStyle/>
+          <a:p>
+            <a:pPr>
+              <a:buFont typeface="Arial" panose="020B0604020202020204" pitchFamily="34" charset="0"/>
+              <a:buChar char="•"/>
+            </a:pPr>
+            <a:r>
+              <a:rPr lang="en-US" dirty="0"/>
+              <a:t> </a:t>
+            </a:r>
+            <a:r>
+              <a:rPr lang="en-US" sz="1800" dirty="0"/>
+              <a:t>Language decisions and implementation method</a:t>
+            </a:r>
+          </a:p>
+          <a:p>
+            <a:pPr>
+              <a:buFont typeface="Arial" panose="020B0604020202020204" pitchFamily="34" charset="0"/>
+              <a:buChar char="•"/>
+            </a:pPr>
+            <a:r>
+              <a:rPr lang="en-US" sz="1800" dirty="0"/>
+              <a:t> Interacting with a PDF</a:t>
+            </a:r>
+          </a:p>
+          <a:p>
+            <a:pPr>
+              <a:buFont typeface="Arial" panose="020B0604020202020204" pitchFamily="34" charset="0"/>
+              <a:buChar char="•"/>
+            </a:pPr>
+            <a:r>
+              <a:rPr lang="en-US" sz="1800" dirty="0"/>
+              <a:t> Understanding program to database interaction</a:t>
+            </a:r>
+          </a:p>
+          <a:p>
+            <a:pPr>
+              <a:buFont typeface="Arial" panose="020B0604020202020204" pitchFamily="34" charset="0"/>
+              <a:buChar char="•"/>
+            </a:pPr>
+            <a:r>
+              <a:rPr lang="en-US" sz="1800" dirty="0"/>
+              <a:t> How to properly write documentation</a:t>
+            </a:r>
+          </a:p>
+        </p:txBody>
+      </p:sp>
+    </p:spTree>
+    <p:extLst>
+      <p:ext uri="{BB962C8B-B14F-4D97-AF65-F5344CB8AC3E}">
+        <p14:creationId xmlns:p14="http://schemas.microsoft.com/office/powerpoint/2010/main" val="1537991812"/>
+      </p:ext>
+    </p:extLst>
+  </p:cSld>
+  <p:clrMapOvr>
+    <a:masterClrMapping/>
+  </p:clrMapOvr>
+</p:sld>
+</file>
+
+<file path=ppt/slides/slide13.xml><?xml version="1.0" encoding="utf-8"?>
+<p:sld xmlns:a="http://schemas.openxmlformats.org/drawingml/2006/main" xmlns:r="http://schemas.openxmlformats.org/officeDocument/2006/relationships" xmlns:p="http://schemas.openxmlformats.org/presentationml/2006/main">
+  <p:cSld>
+    <p:spTree>
+      <p:nvGrpSpPr>
+        <p:cNvPr id="1" name=""/>
+        <p:cNvGrpSpPr/>
+        <p:nvPr/>
+      </p:nvGrpSpPr>
+      <p:grpSpPr>
+        <a:xfrm>
+          <a:off x="0" y="0"/>
+          <a:ext cx="0" cy="0"/>
+          <a:chOff x="0" y="0"/>
+          <a:chExt cx="0" cy="0"/>
+        </a:xfrm>
+      </p:grpSpPr>
+      <p:sp>
+        <p:nvSpPr>
+          <p:cNvPr id="2" name="Title 1">
+            <a:extLst>
+              <a:ext uri="{FF2B5EF4-FFF2-40B4-BE49-F238E27FC236}">
+                <a16:creationId xmlns:a16="http://schemas.microsoft.com/office/drawing/2014/main" id="{981D0141-348B-4BBA-B9CC-5693B0753355}"/>
+              </a:ext>
+            </a:extLst>
+          </p:cNvPr>
+          <p:cNvSpPr>
+            <a:spLocks noGrp="1"/>
+          </p:cNvSpPr>
+          <p:nvPr>
+            <p:ph type="title"/>
+          </p:nvPr>
+        </p:nvSpPr>
+        <p:spPr/>
+        <p:txBody>
+          <a:bodyPr/>
+          <a:lstStyle/>
+          <a:p>
+            <a:r>
+              <a:rPr lang="en-US" dirty="0"/>
+              <a:t>Challenges Not Overcome</a:t>
+            </a:r>
+          </a:p>
+        </p:txBody>
+      </p:sp>
+      <p:sp>
+        <p:nvSpPr>
+          <p:cNvPr id="3" name="Content Placeholder 2">
+            <a:extLst>
+              <a:ext uri="{FF2B5EF4-FFF2-40B4-BE49-F238E27FC236}">
+                <a16:creationId xmlns:a16="http://schemas.microsoft.com/office/drawing/2014/main" id="{E41F6CB3-2222-42D2-B950-15729954AF84}"/>
+              </a:ext>
+            </a:extLst>
+          </p:cNvPr>
+          <p:cNvSpPr>
+            <a:spLocks noGrp="1"/>
+          </p:cNvSpPr>
+          <p:nvPr>
+            <p:ph idx="1"/>
+          </p:nvPr>
+        </p:nvSpPr>
+        <p:spPr/>
+        <p:txBody>
+          <a:bodyPr/>
+          <a:lstStyle/>
+          <a:p>
+            <a:pPr>
+              <a:buFont typeface="Arial" panose="020B0604020202020204" pitchFamily="34" charset="0"/>
+              <a:buChar char="•"/>
+            </a:pPr>
+            <a:r>
+              <a:rPr lang="en-US" dirty="0"/>
+              <a:t> </a:t>
+            </a:r>
+            <a:r>
+              <a:rPr lang="en-US" sz="1800" dirty="0"/>
+              <a:t>Time constraints and full implementation</a:t>
+            </a:r>
+          </a:p>
+          <a:p>
+            <a:pPr>
+              <a:buFont typeface="Arial" panose="020B0604020202020204" pitchFamily="34" charset="0"/>
+              <a:buChar char="•"/>
+            </a:pPr>
+            <a:r>
+              <a:rPr lang="en-US" sz="1800" dirty="0"/>
+              <a:t> Utilizing a fully graphical user interface</a:t>
+            </a:r>
+          </a:p>
+          <a:p>
+            <a:pPr>
+              <a:buFont typeface="Arial" panose="020B0604020202020204" pitchFamily="34" charset="0"/>
+              <a:buChar char="•"/>
+            </a:pPr>
+            <a:r>
+              <a:rPr lang="en-US" sz="1800" dirty="0"/>
+              <a:t> Implementing a way to interpret Dungeons and Dragons spells and abilities</a:t>
+            </a:r>
+          </a:p>
+        </p:txBody>
+      </p:sp>
+    </p:spTree>
+    <p:extLst>
+      <p:ext uri="{BB962C8B-B14F-4D97-AF65-F5344CB8AC3E}">
+        <p14:creationId xmlns:p14="http://schemas.microsoft.com/office/powerpoint/2010/main" val="2164835738"/>
+      </p:ext>
+    </p:extLst>
+  </p:cSld>
+  <p:clrMapOvr>
+    <a:masterClrMapping/>
+  </p:clrMapOvr>
+</p:sld>
+</file>
+
+<file path=ppt/slides/slide14.xml><?xml version="1.0" encoding="utf-8"?>
+<p:sld xmlns:a="http://schemas.openxmlformats.org/drawingml/2006/main" xmlns:r="http://schemas.openxmlformats.org/officeDocument/2006/relationships" xmlns:p="http://schemas.openxmlformats.org/presentationml/2006/main">
+  <p:cSld>
+    <p:spTree>
+      <p:nvGrpSpPr>
+        <p:cNvPr id="1" name=""/>
+        <p:cNvGrpSpPr/>
+        <p:nvPr/>
+      </p:nvGrpSpPr>
+      <p:grpSpPr>
+        <a:xfrm>
+          <a:off x="0" y="0"/>
+          <a:ext cx="0" cy="0"/>
+          <a:chOff x="0" y="0"/>
+          <a:chExt cx="0" cy="0"/>
+        </a:xfrm>
+      </p:grpSpPr>
+      <p:sp>
+        <p:nvSpPr>
+          <p:cNvPr id="2" name="Title 1">
+            <a:extLst>
+              <a:ext uri="{FF2B5EF4-FFF2-40B4-BE49-F238E27FC236}">
                 <a16:creationId xmlns:a16="http://schemas.microsoft.com/office/drawing/2014/main" id="{CEF466E1-5EB1-4937-8B6F-EE83BF200E13}"/>
               </a:ext>
             </a:extLst>
@@ -4084,7 +5150,7 @@
 </p:sld>
 </file>
 
-<file path=ppt/slides/slide13.xml><?xml version="1.0" encoding="utf-8"?>
+<file path=ppt/slides/slide15.xml><?xml version="1.0" encoding="utf-8"?>
 <p:sld xmlns:a="http://schemas.openxmlformats.org/drawingml/2006/main" xmlns:r="http://schemas.openxmlformats.org/officeDocument/2006/relationships" xmlns:p="http://schemas.openxmlformats.org/presentationml/2006/main">
   <p:cSld>
     <p:bg>
@@ -4317,7 +5383,7 @@
                   </a:schemeClr>
                 </a:solidFill>
               </a:rPr>
-              <a:t>End Slide</a:t>
+              <a:t>Questions?</a:t>
             </a:r>
           </a:p>
         </p:txBody>
@@ -5573,7 +6639,7 @@
 </file>
 
 <file path=ppt/slides/slide8.xml><?xml version="1.0" encoding="utf-8"?>
-<p:sld xmlns:a="http://schemas.openxmlformats.org/drawingml/2006/main" xmlns:r="http://schemas.openxmlformats.org/officeDocument/2006/relationships" xmlns:p="http://schemas.openxmlformats.org/presentationml/2006/main">
+<p:sld xmlns:a="http://schemas.openxmlformats.org/drawingml/2006/main" xmlns:r="http://schemas.openxmlformats.org/officeDocument/2006/relationships" xmlns:p="http://schemas.openxmlformats.org/presentationml/2006/main" show="0">
   <p:cSld>
     <p:spTree>
       <p:nvGrpSpPr>
@@ -5594,7 +6660,7 @@
           <p:cNvPr id="2" name="Title 1">
             <a:extLst>
               <a:ext uri="{FF2B5EF4-FFF2-40B4-BE49-F238E27FC236}">
-                <a16:creationId xmlns:a16="http://schemas.microsoft.com/office/drawing/2014/main" id="{26ABC4EC-BB79-460A-B116-B22342F3AD3A}"/>
+                <a16:creationId xmlns:a16="http://schemas.microsoft.com/office/drawing/2014/main" id="{0AAFC3A7-C1F0-44ED-89A9-6512133EDF63}"/>
               </a:ext>
             </a:extLst>
           </p:cNvPr>
@@ -5612,7 +6678,7 @@
           <a:p>
             <a:r>
               <a:rPr lang="en-US" dirty="0"/>
-              <a:t>High-Level Test Plan</a:t>
+              <a:t>Database</a:t>
             </a:r>
           </a:p>
         </p:txBody>
@@ -5622,7 +6688,7 @@
           <p:cNvPr id="3" name="Content Placeholder 2">
             <a:extLst>
               <a:ext uri="{FF2B5EF4-FFF2-40B4-BE49-F238E27FC236}">
-                <a16:creationId xmlns:a16="http://schemas.microsoft.com/office/drawing/2014/main" id="{A14C94AA-6CF4-438C-AAE0-D0E7197EE72E}"/>
+                <a16:creationId xmlns:a16="http://schemas.microsoft.com/office/drawing/2014/main" id="{414E6E3E-1A08-43C9-A14E-AC17C6B8D86B}"/>
               </a:ext>
             </a:extLst>
           </p:cNvPr>
@@ -5633,11 +6699,14 @@
             <p:ph idx="1"/>
           </p:nvPr>
         </p:nvSpPr>
-        <p:spPr/>
-        <p:txBody>
-          <a:bodyPr>
-            <a:normAutofit/>
-          </a:bodyPr>
+        <p:spPr>
+          <a:xfrm>
+            <a:off x="822960" y="1756835"/>
+            <a:ext cx="7543800" cy="481868"/>
+          </a:xfrm>
+        </p:spPr>
+        <p:txBody>
+          <a:bodyPr/>
           <a:lstStyle/>
           <a:p>
             <a:pPr>
@@ -5645,86 +6714,46 @@
               <a:buChar char="•"/>
             </a:pPr>
             <a:r>
-              <a:rPr lang="en-US" sz="1800" dirty="0"/>
-              <a:t> Ensure the product can run on the specified hardware without interruption</a:t>
-            </a:r>
-          </a:p>
-          <a:p>
-            <a:pPr>
-              <a:buFont typeface="Arial" panose="020B0604020202020204" pitchFamily="34" charset="0"/>
-              <a:buChar char="•"/>
-            </a:pPr>
-            <a:r>
-              <a:rPr lang="en-US" sz="1800" dirty="0"/>
-              <a:t> Ensure each functional requirement is met</a:t>
-            </a:r>
-          </a:p>
-          <a:p>
-            <a:pPr lvl="1">
-              <a:buFont typeface="Arial" panose="020B0604020202020204" pitchFamily="34" charset="0"/>
-              <a:buChar char="•"/>
-            </a:pPr>
-            <a:r>
-              <a:rPr lang="en-US" sz="1800" dirty="0"/>
-              <a:t>Data viewing</a:t>
-            </a:r>
-          </a:p>
-          <a:p>
-            <a:pPr lvl="1">
-              <a:buFont typeface="Arial" panose="020B0604020202020204" pitchFamily="34" charset="0"/>
-              <a:buChar char="•"/>
-            </a:pPr>
-            <a:r>
-              <a:rPr lang="en-US" sz="1800" dirty="0"/>
-              <a:t>Data creation</a:t>
-            </a:r>
-          </a:p>
-          <a:p>
-            <a:pPr lvl="1">
-              <a:buFont typeface="Arial" panose="020B0604020202020204" pitchFamily="34" charset="0"/>
-              <a:buChar char="•"/>
-            </a:pPr>
-            <a:r>
-              <a:rPr lang="en-US" sz="1800" dirty="0"/>
-              <a:t>Data storage</a:t>
-            </a:r>
-          </a:p>
-          <a:p>
-            <a:pPr lvl="1">
-              <a:buFont typeface="Arial" panose="020B0604020202020204" pitchFamily="34" charset="0"/>
-              <a:buChar char="•"/>
-            </a:pPr>
-            <a:r>
-              <a:rPr lang="en-US" sz="1800" dirty="0"/>
-              <a:t>Data editing</a:t>
-            </a:r>
-          </a:p>
-          <a:p>
-            <a:pPr>
-              <a:buFont typeface="Arial" panose="020B0604020202020204" pitchFamily="34" charset="0"/>
-              <a:buChar char="•"/>
-            </a:pPr>
-            <a:r>
-              <a:rPr lang="en-US" sz="1800" dirty="0"/>
-              <a:t> Ensure input validation to prevent improper data entry</a:t>
-            </a:r>
-          </a:p>
-          <a:p>
-            <a:pPr>
-              <a:buFont typeface="Arial" panose="020B0604020202020204" pitchFamily="34" charset="0"/>
-              <a:buChar char="•"/>
-            </a:pPr>
-            <a:r>
-              <a:rPr lang="en-US" sz="1800" dirty="0"/>
-              <a:t> Ensure integrity of the database</a:t>
-            </a:r>
-          </a:p>
-        </p:txBody>
-      </p:sp>
+              <a:rPr lang="en-US" dirty="0"/>
+              <a:t> This displays the database functionality, showing stored characters from the program.</a:t>
+            </a:r>
+          </a:p>
+        </p:txBody>
+      </p:sp>
+      <p:pic>
+        <p:nvPicPr>
+          <p:cNvPr id="7" name="Picture 6">
+            <a:extLst>
+              <a:ext uri="{FF2B5EF4-FFF2-40B4-BE49-F238E27FC236}">
+                <a16:creationId xmlns:a16="http://schemas.microsoft.com/office/drawing/2014/main" id="{53E30A8F-735A-480B-B35E-AE50AECE9B81}"/>
+              </a:ext>
+            </a:extLst>
+          </p:cNvPr>
+          <p:cNvPicPr>
+            <a:picLocks noChangeAspect="1"/>
+          </p:cNvPicPr>
+          <p:nvPr/>
+        </p:nvPicPr>
+        <p:blipFill>
+          <a:blip r:embed="rId2"/>
+          <a:stretch>
+            <a:fillRect/>
+          </a:stretch>
+        </p:blipFill>
+        <p:spPr>
+          <a:xfrm>
+            <a:off x="777240" y="2078033"/>
+            <a:ext cx="7543800" cy="3208283"/>
+          </a:xfrm>
+          <a:prstGeom prst="rect">
+            <a:avLst/>
+          </a:prstGeom>
+        </p:spPr>
+      </p:pic>
     </p:spTree>
     <p:extLst>
       <p:ext uri="{BB962C8B-B14F-4D97-AF65-F5344CB8AC3E}">
-        <p14:creationId xmlns:p14="http://schemas.microsoft.com/office/powerpoint/2010/main" val="3173310127"/>
+        <p14:creationId xmlns:p14="http://schemas.microsoft.com/office/powerpoint/2010/main" val="1345032941"/>
       </p:ext>
     </p:extLst>
   </p:cSld>
@@ -5735,7 +6764,7 @@
 </file>
 
 <file path=ppt/slides/slide9.xml><?xml version="1.0" encoding="utf-8"?>
-<p:sld xmlns:a="http://schemas.openxmlformats.org/drawingml/2006/main" xmlns:r="http://schemas.openxmlformats.org/officeDocument/2006/relationships" xmlns:p="http://schemas.openxmlformats.org/presentationml/2006/main">
+<p:sld xmlns:a="http://schemas.openxmlformats.org/drawingml/2006/main" xmlns:r="http://schemas.openxmlformats.org/officeDocument/2006/relationships" xmlns:p="http://schemas.openxmlformats.org/presentationml/2006/main" show="0">
   <p:cSld>
     <p:spTree>
       <p:nvGrpSpPr>
@@ -5756,7 +6785,7 @@
           <p:cNvPr id="2" name="Title 1">
             <a:extLst>
               <a:ext uri="{FF2B5EF4-FFF2-40B4-BE49-F238E27FC236}">
-                <a16:creationId xmlns:a16="http://schemas.microsoft.com/office/drawing/2014/main" id="{43927D3B-E43C-4A7C-A5B5-0CC73CFFDEF6}"/>
+                <a16:creationId xmlns:a16="http://schemas.microsoft.com/office/drawing/2014/main" id="{992A6AC6-8DE2-4CF4-ACD8-91F1DDD0A073}"/>
               </a:ext>
             </a:extLst>
           </p:cNvPr>
@@ -5767,14 +6796,19 @@
             <p:ph type="title"/>
           </p:nvPr>
         </p:nvSpPr>
-        <p:spPr/>
+        <p:spPr>
+          <a:xfrm>
+            <a:off x="822960" y="238836"/>
+            <a:ext cx="3417964" cy="1208964"/>
+          </a:xfrm>
+        </p:spPr>
         <p:txBody>
           <a:bodyPr/>
           <a:lstStyle/>
           <a:p>
             <a:r>
               <a:rPr lang="en-US" dirty="0"/>
-              <a:t>Test Results</a:t>
+              <a:t>Character Data Creation</a:t>
             </a:r>
           </a:p>
         </p:txBody>
@@ -5784,7 +6818,7 @@
           <p:cNvPr id="3" name="Content Placeholder 2">
             <a:extLst>
               <a:ext uri="{FF2B5EF4-FFF2-40B4-BE49-F238E27FC236}">
-                <a16:creationId xmlns:a16="http://schemas.microsoft.com/office/drawing/2014/main" id="{3E42D5C9-29FC-42DF-84EF-5E42DF94DC75}"/>
+                <a16:creationId xmlns:a16="http://schemas.microsoft.com/office/drawing/2014/main" id="{3AB7899C-DA03-4042-8B58-A6D1237DC43C}"/>
               </a:ext>
             </a:extLst>
           </p:cNvPr>
@@ -5795,11 +6829,14 @@
             <p:ph idx="1"/>
           </p:nvPr>
         </p:nvSpPr>
-        <p:spPr/>
-        <p:txBody>
-          <a:bodyPr>
-            <a:normAutofit fontScale="92500" lnSpcReduction="10000"/>
-          </a:bodyPr>
+        <p:spPr>
+          <a:xfrm>
+            <a:off x="822960" y="1756835"/>
+            <a:ext cx="3481026" cy="803485"/>
+          </a:xfrm>
+        </p:spPr>
+        <p:txBody>
+          <a:bodyPr/>
           <a:lstStyle/>
           <a:p>
             <a:pPr>
@@ -5808,99 +6845,45 @@
             </a:pPr>
             <a:r>
               <a:rPr lang="en-US" dirty="0"/>
-              <a:t> </a:t>
-            </a:r>
-            <a:r>
-              <a:rPr lang="en-US" sz="1800" dirty="0"/>
-              <a:t>Results of Testing to be placed here – EX BELOW</a:t>
-            </a:r>
-          </a:p>
-          <a:p>
-            <a:pPr>
-              <a:buFont typeface="Arial" panose="020B0604020202020204" pitchFamily="34" charset="0"/>
-              <a:buChar char="•"/>
-            </a:pPr>
-            <a:r>
-              <a:rPr lang="en-US" sz="1800" dirty="0"/>
-              <a:t> Project runtime performance</a:t>
-            </a:r>
-          </a:p>
-          <a:p>
-            <a:pPr lvl="1">
-              <a:buFont typeface="Arial" panose="020B0604020202020204" pitchFamily="34" charset="0"/>
-              <a:buChar char="•"/>
-            </a:pPr>
-            <a:r>
-              <a:rPr lang="en-US" sz="1800" dirty="0"/>
-              <a:t>No issues detected</a:t>
-            </a:r>
-          </a:p>
-          <a:p>
-            <a:pPr>
-              <a:buFont typeface="Arial" panose="020B0604020202020204" pitchFamily="34" charset="0"/>
-              <a:buChar char="•"/>
-            </a:pPr>
-            <a:r>
-              <a:rPr lang="en-US" sz="1800" dirty="0"/>
-              <a:t> Functional requirement testing</a:t>
-            </a:r>
-          </a:p>
-          <a:p>
-            <a:pPr lvl="1">
-              <a:buFont typeface="Arial" panose="020B0604020202020204" pitchFamily="34" charset="0"/>
-              <a:buChar char="•"/>
-            </a:pPr>
-            <a:r>
-              <a:rPr lang="en-US" sz="1800" dirty="0"/>
-              <a:t>Data viewing – The data was displayed accurately and without error</a:t>
-            </a:r>
-          </a:p>
-          <a:p>
-            <a:pPr lvl="1">
-              <a:buFont typeface="Arial" panose="020B0604020202020204" pitchFamily="34" charset="0"/>
-              <a:buChar char="•"/>
-            </a:pPr>
-            <a:r>
-              <a:rPr lang="en-US" sz="1800" dirty="0"/>
-              <a:t>Data creation – The data was created without improper input</a:t>
-            </a:r>
-          </a:p>
-          <a:p>
-            <a:pPr lvl="1">
-              <a:buFont typeface="Arial" panose="020B0604020202020204" pitchFamily="34" charset="0"/>
-              <a:buChar char="•"/>
-            </a:pPr>
-            <a:r>
-              <a:rPr lang="en-US" sz="1800" dirty="0"/>
-              <a:t>Data viewing - ~~~~~~</a:t>
-            </a:r>
-          </a:p>
-          <a:p>
-            <a:pPr>
-              <a:buFont typeface="Arial" panose="020B0604020202020204" pitchFamily="34" charset="0"/>
-              <a:buChar char="•"/>
-            </a:pPr>
-            <a:r>
-              <a:rPr lang="en-US" sz="1800" dirty="0"/>
-              <a:t> Graphical user interface</a:t>
-            </a:r>
-          </a:p>
-          <a:p>
-            <a:pPr lvl="1">
-              <a:buFont typeface="Arial" panose="020B0604020202020204" pitchFamily="34" charset="0"/>
-              <a:buChar char="•"/>
-            </a:pPr>
-            <a:r>
-              <a:rPr lang="en-US" sz="1800" dirty="0"/>
-              <a:t>No graphical user interface was implemented</a:t>
-            </a:r>
-          </a:p>
-        </p:txBody>
-      </p:sp>
+              <a:t> This displays the process of character creation with error messages</a:t>
+            </a:r>
+          </a:p>
+        </p:txBody>
+      </p:sp>
+      <p:pic>
+        <p:nvPicPr>
+          <p:cNvPr id="5" name="Picture 4">
+            <a:extLst>
+              <a:ext uri="{FF2B5EF4-FFF2-40B4-BE49-F238E27FC236}">
+                <a16:creationId xmlns:a16="http://schemas.microsoft.com/office/drawing/2014/main" id="{DD3D739E-8BFF-4F0F-AC26-D8F652B4AD0F}"/>
+              </a:ext>
+            </a:extLst>
+          </p:cNvPr>
+          <p:cNvPicPr>
+            <a:picLocks noChangeAspect="1"/>
+          </p:cNvPicPr>
+          <p:nvPr/>
+        </p:nvPicPr>
+        <p:blipFill>
+          <a:blip r:embed="rId2"/>
+          <a:stretch>
+            <a:fillRect/>
+          </a:stretch>
+        </p:blipFill>
+        <p:spPr>
+          <a:xfrm>
+            <a:off x="4012324" y="1"/>
+            <a:ext cx="5131676" cy="5369328"/>
+          </a:xfrm>
+          <a:prstGeom prst="rect">
+            <a:avLst/>
+          </a:prstGeom>
+        </p:spPr>
+      </p:pic>
     </p:spTree>
     <p:extLst>
       <p:ext uri="{BB962C8B-B14F-4D97-AF65-F5344CB8AC3E}">
-        <p14:creationId xmlns:p14="http://schemas.microsoft.com/office/powerpoint/2010/main" val="1090579756"/>
+        <p14:creationId xmlns:p14="http://schemas.microsoft.com/office/powerpoint/2010/main" val="872376086"/>
       </p:ext>
     </p:extLst>
   </p:cSld>
@@ -6193,6 +7176,301 @@
 </a:theme>
 </file>
 
+<file path=ppt/theme/theme2.xml><?xml version="1.0" encoding="utf-8"?>
+<a:theme xmlns:a="http://schemas.openxmlformats.org/drawingml/2006/main" name="Office Theme">
+  <a:themeElements>
+    <a:clrScheme name="Office">
+      <a:dk1>
+        <a:sysClr val="windowText" lastClr="000000"/>
+      </a:dk1>
+      <a:lt1>
+        <a:sysClr val="window" lastClr="FFFFFF"/>
+      </a:lt1>
+      <a:dk2>
+        <a:srgbClr val="44546A"/>
+      </a:dk2>
+      <a:lt2>
+        <a:srgbClr val="E7E6E6"/>
+      </a:lt2>
+      <a:accent1>
+        <a:srgbClr val="4472C4"/>
+      </a:accent1>
+      <a:accent2>
+        <a:srgbClr val="ED7D31"/>
+      </a:accent2>
+      <a:accent3>
+        <a:srgbClr val="A5A5A5"/>
+      </a:accent3>
+      <a:accent4>
+        <a:srgbClr val="FFC000"/>
+      </a:accent4>
+      <a:accent5>
+        <a:srgbClr val="5B9BD5"/>
+      </a:accent5>
+      <a:accent6>
+        <a:srgbClr val="70AD47"/>
+      </a:accent6>
+      <a:hlink>
+        <a:srgbClr val="0563C1"/>
+      </a:hlink>
+      <a:folHlink>
+        <a:srgbClr val="954F72"/>
+      </a:folHlink>
+    </a:clrScheme>
+    <a:fontScheme name="Office">
+      <a:majorFont>
+        <a:latin typeface="Calibri Light" panose="020F0302020204030204"/>
+        <a:ea typeface=""/>
+        <a:cs typeface=""/>
+        <a:font script="Jpan" typeface="游ゴシック Light"/>
+        <a:font script="Hang" typeface="맑은 고딕"/>
+        <a:font script="Hans" typeface="等线 Light"/>
+        <a:font script="Hant" typeface="新細明體"/>
+        <a:font script="Arab" typeface="Times New Roman"/>
+        <a:font script="Hebr" typeface="Times New Roman"/>
+        <a:font script="Thai" typeface="Angsana New"/>
+        <a:font script="Ethi" typeface="Nyala"/>
+        <a:font script="Beng" typeface="Vrinda"/>
+        <a:font script="Gujr" typeface="Shruti"/>
+        <a:font script="Khmr" typeface="MoolBoran"/>
+        <a:font script="Knda" typeface="Tunga"/>
+        <a:font script="Guru" typeface="Raavi"/>
+        <a:font script="Cans" typeface="Euphemia"/>
+        <a:font script="Cher" typeface="Plantagenet Cherokee"/>
+        <a:font script="Yiii" typeface="Microsoft Yi Baiti"/>
+        <a:font script="Tibt" typeface="Microsoft Himalaya"/>
+        <a:font script="Thaa" typeface="MV Boli"/>
+        <a:font script="Deva" typeface="Mangal"/>
+        <a:font script="Telu" typeface="Gautami"/>
+        <a:font script="Taml" typeface="Latha"/>
+        <a:font script="Syrc" typeface="Estrangelo Edessa"/>
+        <a:font script="Orya" typeface="Kalinga"/>
+        <a:font script="Mlym" typeface="Kartika"/>
+        <a:font script="Laoo" typeface="DokChampa"/>
+        <a:font script="Sinh" typeface="Iskoola Pota"/>
+        <a:font script="Mong" typeface="Mongolian Baiti"/>
+        <a:font script="Viet" typeface="Times New Roman"/>
+        <a:font script="Uigh" typeface="Microsoft Uighur"/>
+        <a:font script="Geor" typeface="Sylfaen"/>
+        <a:font script="Armn" typeface="Arial"/>
+        <a:font script="Bugi" typeface="Leelawadee UI"/>
+        <a:font script="Bopo" typeface="Microsoft JhengHei"/>
+        <a:font script="Java" typeface="Javanese Text"/>
+        <a:font script="Lisu" typeface="Segoe UI"/>
+        <a:font script="Mymr" typeface="Myanmar Text"/>
+        <a:font script="Nkoo" typeface="Ebrima"/>
+        <a:font script="Olck" typeface="Nirmala UI"/>
+        <a:font script="Osma" typeface="Ebrima"/>
+        <a:font script="Phag" typeface="Phagspa"/>
+        <a:font script="Syrn" typeface="Estrangelo Edessa"/>
+        <a:font script="Syrj" typeface="Estrangelo Edessa"/>
+        <a:font script="Syre" typeface="Estrangelo Edessa"/>
+        <a:font script="Sora" typeface="Nirmala UI"/>
+        <a:font script="Tale" typeface="Microsoft Tai Le"/>
+        <a:font script="Talu" typeface="Microsoft New Tai Lue"/>
+        <a:font script="Tfng" typeface="Ebrima"/>
+      </a:majorFont>
+      <a:minorFont>
+        <a:latin typeface="Calibri" panose="020F0502020204030204"/>
+        <a:ea typeface=""/>
+        <a:cs typeface=""/>
+        <a:font script="Jpan" typeface="游ゴシック"/>
+        <a:font script="Hang" typeface="맑은 고딕"/>
+        <a:font script="Hans" typeface="等线"/>
+        <a:font script="Hant" typeface="新細明體"/>
+        <a:font script="Arab" typeface="Arial"/>
+        <a:font script="Hebr" typeface="Arial"/>
+        <a:font script="Thai" typeface="Cordia New"/>
+        <a:font script="Ethi" typeface="Nyala"/>
+        <a:font script="Beng" typeface="Vrinda"/>
+        <a:font script="Gujr" typeface="Shruti"/>
+        <a:font script="Khmr" typeface="DaunPenh"/>
+        <a:font script="Knda" typeface="Tunga"/>
+        <a:font script="Guru" typeface="Raavi"/>
+        <a:font script="Cans" typeface="Euphemia"/>
+        <a:font script="Cher" typeface="Plantagenet Cherokee"/>
+        <a:font script="Yiii" typeface="Microsoft Yi Baiti"/>
+        <a:font script="Tibt" typeface="Microsoft Himalaya"/>
+        <a:font script="Thaa" typeface="MV Boli"/>
+        <a:font script="Deva" typeface="Mangal"/>
+        <a:font script="Telu" typeface="Gautami"/>
+        <a:font script="Taml" typeface="Latha"/>
+        <a:font script="Syrc" typeface="Estrangelo Edessa"/>
+        <a:font script="Orya" typeface="Kalinga"/>
+        <a:font script="Mlym" typeface="Kartika"/>
+        <a:font script="Laoo" typeface="DokChampa"/>
+        <a:font script="Sinh" typeface="Iskoola Pota"/>
+        <a:font script="Mong" typeface="Mongolian Baiti"/>
+        <a:font script="Viet" typeface="Arial"/>
+        <a:font script="Uigh" typeface="Microsoft Uighur"/>
+        <a:font script="Geor" typeface="Sylfaen"/>
+        <a:font script="Armn" typeface="Arial"/>
+        <a:font script="Bugi" typeface="Leelawadee UI"/>
+        <a:font script="Bopo" typeface="Microsoft JhengHei"/>
+        <a:font script="Java" typeface="Javanese Text"/>
+        <a:font script="Lisu" typeface="Segoe UI"/>
+        <a:font script="Mymr" typeface="Myanmar Text"/>
+        <a:font script="Nkoo" typeface="Ebrima"/>
+        <a:font script="Olck" typeface="Nirmala UI"/>
+        <a:font script="Osma" typeface="Ebrima"/>
+        <a:font script="Phag" typeface="Phagspa"/>
+        <a:font script="Syrn" typeface="Estrangelo Edessa"/>
+        <a:font script="Syrj" typeface="Estrangelo Edessa"/>
+        <a:font script="Syre" typeface="Estrangelo Edessa"/>
+        <a:font script="Sora" typeface="Nirmala UI"/>
+        <a:font script="Tale" typeface="Microsoft Tai Le"/>
+        <a:font script="Talu" typeface="Microsoft New Tai Lue"/>
+        <a:font script="Tfng" typeface="Ebrima"/>
+      </a:minorFont>
+    </a:fontScheme>
+    <a:fmtScheme name="Office">
+      <a:fillStyleLst>
+        <a:solidFill>
+          <a:schemeClr val="phClr"/>
+        </a:solidFill>
+        <a:gradFill rotWithShape="1">
+          <a:gsLst>
+            <a:gs pos="0">
+              <a:schemeClr val="phClr">
+                <a:lumMod val="110000"/>
+                <a:satMod val="105000"/>
+                <a:tint val="67000"/>
+              </a:schemeClr>
+            </a:gs>
+            <a:gs pos="50000">
+              <a:schemeClr val="phClr">
+                <a:lumMod val="105000"/>
+                <a:satMod val="103000"/>
+                <a:tint val="73000"/>
+              </a:schemeClr>
+            </a:gs>
+            <a:gs pos="100000">
+              <a:schemeClr val="phClr">
+                <a:lumMod val="105000"/>
+                <a:satMod val="109000"/>
+                <a:tint val="81000"/>
+              </a:schemeClr>
+            </a:gs>
+          </a:gsLst>
+          <a:lin ang="5400000" scaled="0"/>
+        </a:gradFill>
+        <a:gradFill rotWithShape="1">
+          <a:gsLst>
+            <a:gs pos="0">
+              <a:schemeClr val="phClr">
+                <a:satMod val="103000"/>
+                <a:lumMod val="102000"/>
+                <a:tint val="94000"/>
+              </a:schemeClr>
+            </a:gs>
+            <a:gs pos="50000">
+              <a:schemeClr val="phClr">
+                <a:satMod val="110000"/>
+                <a:lumMod val="100000"/>
+                <a:shade val="100000"/>
+              </a:schemeClr>
+            </a:gs>
+            <a:gs pos="100000">
+              <a:schemeClr val="phClr">
+                <a:lumMod val="99000"/>
+                <a:satMod val="120000"/>
+                <a:shade val="78000"/>
+              </a:schemeClr>
+            </a:gs>
+          </a:gsLst>
+          <a:lin ang="5400000" scaled="0"/>
+        </a:gradFill>
+      </a:fillStyleLst>
+      <a:lnStyleLst>
+        <a:ln w="6350" cap="flat" cmpd="sng" algn="ctr">
+          <a:solidFill>
+            <a:schemeClr val="phClr"/>
+          </a:solidFill>
+          <a:prstDash val="solid"/>
+          <a:miter lim="800000"/>
+        </a:ln>
+        <a:ln w="12700" cap="flat" cmpd="sng" algn="ctr">
+          <a:solidFill>
+            <a:schemeClr val="phClr"/>
+          </a:solidFill>
+          <a:prstDash val="solid"/>
+          <a:miter lim="800000"/>
+        </a:ln>
+        <a:ln w="19050" cap="flat" cmpd="sng" algn="ctr">
+          <a:solidFill>
+            <a:schemeClr val="phClr"/>
+          </a:solidFill>
+          <a:prstDash val="solid"/>
+          <a:miter lim="800000"/>
+        </a:ln>
+      </a:lnStyleLst>
+      <a:effectStyleLst>
+        <a:effectStyle>
+          <a:effectLst/>
+        </a:effectStyle>
+        <a:effectStyle>
+          <a:effectLst/>
+        </a:effectStyle>
+        <a:effectStyle>
+          <a:effectLst>
+            <a:outerShdw blurRad="57150" dist="19050" dir="5400000" algn="ctr" rotWithShape="0">
+              <a:srgbClr val="000000">
+                <a:alpha val="63000"/>
+              </a:srgbClr>
+            </a:outerShdw>
+          </a:effectLst>
+        </a:effectStyle>
+      </a:effectStyleLst>
+      <a:bgFillStyleLst>
+        <a:solidFill>
+          <a:schemeClr val="phClr"/>
+        </a:solidFill>
+        <a:solidFill>
+          <a:schemeClr val="phClr">
+            <a:tint val="95000"/>
+            <a:satMod val="170000"/>
+          </a:schemeClr>
+        </a:solidFill>
+        <a:gradFill rotWithShape="1">
+          <a:gsLst>
+            <a:gs pos="0">
+              <a:schemeClr val="phClr">
+                <a:tint val="93000"/>
+                <a:satMod val="150000"/>
+                <a:shade val="98000"/>
+                <a:lumMod val="102000"/>
+              </a:schemeClr>
+            </a:gs>
+            <a:gs pos="50000">
+              <a:schemeClr val="phClr">
+                <a:tint val="98000"/>
+                <a:satMod val="130000"/>
+                <a:shade val="90000"/>
+                <a:lumMod val="103000"/>
+              </a:schemeClr>
+            </a:gs>
+            <a:gs pos="100000">
+              <a:schemeClr val="phClr">
+                <a:shade val="63000"/>
+                <a:satMod val="120000"/>
+              </a:schemeClr>
+            </a:gs>
+          </a:gsLst>
+          <a:lin ang="5400000" scaled="0"/>
+        </a:gradFill>
+      </a:bgFillStyleLst>
+    </a:fmtScheme>
+  </a:themeElements>
+  <a:objectDefaults/>
+  <a:extraClrSchemeLst/>
+  <a:extLst>
+    <a:ext uri="{05A4C25C-085E-4340-85A3-A5531E510DB2}">
+      <thm15:themeFamily xmlns:thm15="http://schemas.microsoft.com/office/thememl/2012/main" name="Office Theme" id="{62F939B6-93AF-4DB8-9C6B-D6C7DFDC589F}" vid="{4A3C46E8-61CC-4603-A589-7422A47A8E4A}"/>
+    </a:ext>
+  </a:extLst>
+</a:theme>
+</file>
+
 <file path=ppt/theme/themeOverride1.xml><?xml version="1.0" encoding="utf-8"?>
 <a:themeOverride xmlns:a="http://schemas.openxmlformats.org/drawingml/2006/main">
   <a:clrScheme name="Parcel">
@@ -6246,6 +7524,15 @@
 </file>
 
 <file path=customXml/item2.xml><?xml version="1.0" encoding="utf-8"?>
+<?mso-contentType ?>
+<FormTemplates xmlns="http://schemas.microsoft.com/sharepoint/v3/contenttype/forms">
+  <Display>DocumentLibraryForm</Display>
+  <Edit>DocumentLibraryForm</Edit>
+  <New>DocumentLibraryForm</New>
+</FormTemplates>
+</file>
+
+<file path=customXml/item3.xml><?xml version="1.0" encoding="utf-8"?>
 <ct:contentTypeSchema xmlns:ct="http://schemas.microsoft.com/office/2006/metadata/contentType" xmlns:ma="http://schemas.microsoft.com/office/2006/metadata/properties/metaAttributes" ct:_="" ma:_="" ma:contentTypeName="Document" ma:contentTypeID="0x01010079F111ED35F8CC479449609E8A0923A6" ma:contentTypeVersion="12" ma:contentTypeDescription="Create a new document." ma:contentTypeScope="" ma:versionID="426e97fa315356fffbdcd9876fe988c2">
   <xsd:schema xmlns:xsd="http://www.w3.org/2001/XMLSchema" xmlns:xs="http://www.w3.org/2001/XMLSchema" xmlns:p="http://schemas.microsoft.com/office/2006/metadata/properties" xmlns:ns2="71af3243-3dd4-4a8d-8c0d-dd76da1f02a5" xmlns:ns3="16c05727-aa75-4e4a-9b5f-8a80a1165891" targetNamespace="http://schemas.microsoft.com/office/2006/metadata/properties" ma:root="true" ma:fieldsID="14b8f0def80e6d70ce3def20c90759ae" ns2:_="" ns3:_="">
     <xsd:import namespace="71af3243-3dd4-4a8d-8c0d-dd76da1f02a5"/>
@@ -6466,15 +7753,6 @@
 </ct:contentTypeSchema>
 </file>
 
-<file path=customXml/item3.xml><?xml version="1.0" encoding="utf-8"?>
-<?mso-contentType ?>
-<FormTemplates xmlns="http://schemas.microsoft.com/sharepoint/v3/contenttype/forms">
-  <Display>DocumentLibraryForm</Display>
-  <Edit>DocumentLibraryForm</Edit>
-  <New>DocumentLibraryForm</New>
-</FormTemplates>
-</file>
-
 <file path=customXml/itemProps1.xml><?xml version="1.0" encoding="utf-8"?>
 <ds:datastoreItem xmlns:ds="http://schemas.openxmlformats.org/officeDocument/2006/customXml" ds:itemID="{84F503EC-3FFF-4193-A86F-39150E2BAC75}">
   <ds:schemaRefs>
@@ -6486,6 +7764,14 @@
 </file>
 
 <file path=customXml/itemProps2.xml><?xml version="1.0" encoding="utf-8"?>
+<ds:datastoreItem xmlns:ds="http://schemas.openxmlformats.org/officeDocument/2006/customXml" ds:itemID="{2E5ECA37-C458-4BA2-A090-D7A19E07B434}">
+  <ds:schemaRefs>
+    <ds:schemaRef ds:uri="http://schemas.microsoft.com/sharepoint/v3/contenttype/forms"/>
+  </ds:schemaRefs>
+</ds:datastoreItem>
+</file>
+
+<file path=customXml/itemProps3.xml><?xml version="1.0" encoding="utf-8"?>
 <ds:datastoreItem xmlns:ds="http://schemas.openxmlformats.org/officeDocument/2006/customXml" ds:itemID="{7A26AAF5-6CFC-4C52-B7DF-08410EDE6701}">
   <ds:schemaRefs>
     <ds:schemaRef ds:uri="http://schemas.microsoft.com/office/2006/metadata/contentType"/>
@@ -6502,12 +7788,4 @@
     <ds:schemaRef ds:uri="http://schemas.microsoft.com/internal/obd"/>
   </ds:schemaRefs>
 </ds:datastoreItem>
-</file>
-
-<file path=customXml/itemProps3.xml><?xml version="1.0" encoding="utf-8"?>
-<ds:datastoreItem xmlns:ds="http://schemas.openxmlformats.org/officeDocument/2006/customXml" ds:itemID="{2E5ECA37-C458-4BA2-A090-D7A19E07B434}">
-  <ds:schemaRefs>
-    <ds:schemaRef ds:uri="http://schemas.microsoft.com/sharepoint/v3/contenttype/forms"/>
-  </ds:schemaRefs>
-</ds:datastoreItem>
 </file>
</xml_diff>

<commit_message>
Updated powerpoint and added PDF version
</commit_message>
<xml_diff>
--- a/Documentation/Project_Powerpoint.pptx
+++ b/Documentation/Project_Powerpoint.pptx
@@ -13,8 +13,8 @@
     <p:sldId id="287" r:id="rId7"/>
     <p:sldId id="291" r:id="rId8"/>
     <p:sldId id="288" r:id="rId9"/>
-    <p:sldId id="292" r:id="rId10"/>
-    <p:sldId id="293" r:id="rId11"/>
+    <p:sldId id="293" r:id="rId10"/>
+    <p:sldId id="292" r:id="rId11"/>
     <p:sldId id="299" r:id="rId12"/>
     <p:sldId id="300" r:id="rId13"/>
     <p:sldId id="294" r:id="rId14"/>
@@ -696,9 +696,39 @@
           <a:bodyPr/>
           <a:lstStyle/>
           <a:p>
+            <a:pPr marL="228600" indent="-228600">
+              <a:buAutoNum type="arabicPeriod"/>
+            </a:pPr>
             <a:r>
               <a:rPr lang="en-US" dirty="0"/>
-              <a:t>Spend little time. Note documentation.</a:t>
+              <a:t>Load from PDF – Test.pdf (MAKE SURE TO SHOW IF PDF CAN’T BE FOUND)</a:t>
+            </a:r>
+          </a:p>
+          <a:p>
+            <a:pPr marL="228600" indent="-228600">
+              <a:buAutoNum type="arabicPeriod"/>
+            </a:pPr>
+            <a:r>
+              <a:rPr lang="en-US" dirty="0"/>
+              <a:t>Edit a statistic</a:t>
+            </a:r>
+          </a:p>
+          <a:p>
+            <a:pPr marL="228600" indent="-228600">
+              <a:buAutoNum type="arabicPeriod"/>
+            </a:pPr>
+            <a:r>
+              <a:rPr lang="en-US" dirty="0"/>
+              <a:t>View the character</a:t>
+            </a:r>
+          </a:p>
+          <a:p>
+            <a:pPr marL="228600" indent="-228600">
+              <a:buAutoNum type="arabicPeriod"/>
+            </a:pPr>
+            <a:r>
+              <a:rPr lang="en-US"/>
+              <a:t>Restart program to show it is saved</a:t>
             </a:r>
           </a:p>
         </p:txBody>
@@ -729,7 +759,7 @@
     </p:spTree>
     <p:extLst>
       <p:ext uri="{BB962C8B-B14F-4D97-AF65-F5344CB8AC3E}">
-        <p14:creationId xmlns:p14="http://schemas.microsoft.com/office/powerpoint/2010/main" val="415703412"/>
+        <p14:creationId xmlns:p14="http://schemas.microsoft.com/office/powerpoint/2010/main" val="3320056167"/>
       </p:ext>
     </p:extLst>
   </p:cSld>
@@ -783,39 +813,9 @@
           <a:bodyPr/>
           <a:lstStyle/>
           <a:p>
-            <a:pPr marL="228600" indent="-228600">
-              <a:buAutoNum type="arabicPeriod"/>
-            </a:pPr>
             <a:r>
               <a:rPr lang="en-US" dirty="0"/>
-              <a:t>Load from PDF – Test.pdf (MAKE SURE TO SHOW IF PDF CAN’T BE FOUND)</a:t>
-            </a:r>
-          </a:p>
-          <a:p>
-            <a:pPr marL="228600" indent="-228600">
-              <a:buAutoNum type="arabicPeriod"/>
-            </a:pPr>
-            <a:r>
-              <a:rPr lang="en-US" dirty="0"/>
-              <a:t>Edit a statistic</a:t>
-            </a:r>
-          </a:p>
-          <a:p>
-            <a:pPr marL="228600" indent="-228600">
-              <a:buAutoNum type="arabicPeriod"/>
-            </a:pPr>
-            <a:r>
-              <a:rPr lang="en-US" dirty="0"/>
-              <a:t>View the character</a:t>
-            </a:r>
-          </a:p>
-          <a:p>
-            <a:pPr marL="228600" indent="-228600">
-              <a:buAutoNum type="arabicPeriod"/>
-            </a:pPr>
-            <a:r>
-              <a:rPr lang="en-US"/>
-              <a:t>Restart program to show it is saved</a:t>
+              <a:t>Spend little time. Note documentation.</a:t>
             </a:r>
           </a:p>
         </p:txBody>
@@ -846,7 +846,7 @@
     </p:spTree>
     <p:extLst>
       <p:ext uri="{BB962C8B-B14F-4D97-AF65-F5344CB8AC3E}">
-        <p14:creationId xmlns:p14="http://schemas.microsoft.com/office/powerpoint/2010/main" val="3320056167"/>
+        <p14:creationId xmlns:p14="http://schemas.microsoft.com/office/powerpoint/2010/main" val="415703412"/>
       </p:ext>
     </p:extLst>
   </p:cSld>
@@ -6469,7 +6469,7 @@
           <p:cNvPr id="2" name="Title 1">
             <a:extLst>
               <a:ext uri="{FF2B5EF4-FFF2-40B4-BE49-F238E27FC236}">
-                <a16:creationId xmlns:a16="http://schemas.microsoft.com/office/drawing/2014/main" id="{635725E4-09A8-4723-96EE-C93CB193F2C0}"/>
+                <a16:creationId xmlns:a16="http://schemas.microsoft.com/office/drawing/2014/main" id="{3C1DF106-4F00-4AE2-9128-0C23044CFF79}"/>
               </a:ext>
             </a:extLst>
           </p:cNvPr>
@@ -6477,7 +6477,7 @@
             <a:spLocks noGrp="1"/>
           </p:cNvSpPr>
           <p:nvPr>
-            <p:ph type="title"/>
+            <p:ph type="ctrTitle"/>
           </p:nvPr>
         </p:nvSpPr>
         <p:spPr/>
@@ -6485,83 +6485,10 @@
           <a:bodyPr/>
           <a:lstStyle/>
           <a:p>
+            <a:pPr algn="ctr"/>
             <a:r>
               <a:rPr lang="en-US" dirty="0"/>
-              <a:t>Functional Requirements</a:t>
-            </a:r>
-          </a:p>
-        </p:txBody>
-      </p:sp>
-      <p:sp>
-        <p:nvSpPr>
-          <p:cNvPr id="3" name="Content Placeholder 2">
-            <a:extLst>
-              <a:ext uri="{FF2B5EF4-FFF2-40B4-BE49-F238E27FC236}">
-                <a16:creationId xmlns:a16="http://schemas.microsoft.com/office/drawing/2014/main" id="{E26F6CD7-834F-49EC-8D3E-9FAC381969FD}"/>
-              </a:ext>
-            </a:extLst>
-          </p:cNvPr>
-          <p:cNvSpPr>
-            <a:spLocks noGrp="1"/>
-          </p:cNvSpPr>
-          <p:nvPr>
-            <p:ph idx="1"/>
-          </p:nvPr>
-        </p:nvSpPr>
-        <p:spPr/>
-        <p:txBody>
-          <a:bodyPr>
-            <a:normAutofit/>
-          </a:bodyPr>
-          <a:lstStyle/>
-          <a:p>
-            <a:pPr>
-              <a:buFont typeface="Arial" panose="020B0604020202020204" pitchFamily="34" charset="0"/>
-              <a:buChar char="•"/>
-            </a:pPr>
-            <a:r>
-              <a:rPr lang="en-US" sz="1800" dirty="0"/>
-              <a:t> Allow the storing and loading of character data for later reference</a:t>
-            </a:r>
-          </a:p>
-          <a:p>
-            <a:pPr>
-              <a:buFont typeface="Arial" panose="020B0604020202020204" pitchFamily="34" charset="0"/>
-              <a:buChar char="•"/>
-            </a:pPr>
-            <a:r>
-              <a:rPr lang="en-US" sz="1800" dirty="0"/>
-              <a:t> Allow for modification of character data</a:t>
-            </a:r>
-          </a:p>
-          <a:p>
-            <a:pPr>
-              <a:buFont typeface="Arial" panose="020B0604020202020204" pitchFamily="34" charset="0"/>
-              <a:buChar char="•"/>
-            </a:pPr>
-            <a:r>
-              <a:rPr lang="en-US" sz="1800" dirty="0"/>
-              <a:t> Allow for the creation of new character data</a:t>
-            </a:r>
-          </a:p>
-          <a:p>
-            <a:pPr>
-              <a:buFont typeface="Arial" panose="020B0604020202020204" pitchFamily="34" charset="0"/>
-              <a:buChar char="•"/>
-            </a:pPr>
-            <a:r>
-              <a:rPr lang="en-US" sz="1800" dirty="0"/>
-              <a:t> Allow for the importing of character data from a standardized PDF</a:t>
-            </a:r>
-          </a:p>
-          <a:p>
-            <a:pPr>
-              <a:buFont typeface="Arial" panose="020B0604020202020204" pitchFamily="34" charset="0"/>
-              <a:buChar char="•"/>
-            </a:pPr>
-            <a:r>
-              <a:rPr lang="en-US" sz="1800" dirty="0"/>
-              <a:t> Allow for the viewing of character data</a:t>
+              <a:t>Demo</a:t>
             </a:r>
           </a:p>
         </p:txBody>
@@ -6569,7 +6496,7 @@
     </p:spTree>
     <p:extLst>
       <p:ext uri="{BB962C8B-B14F-4D97-AF65-F5344CB8AC3E}">
-        <p14:creationId xmlns:p14="http://schemas.microsoft.com/office/powerpoint/2010/main" val="4180510243"/>
+        <p14:creationId xmlns:p14="http://schemas.microsoft.com/office/powerpoint/2010/main" val="140397030"/>
       </p:ext>
     </p:extLst>
   </p:cSld>
@@ -6601,7 +6528,7 @@
           <p:cNvPr id="2" name="Title 1">
             <a:extLst>
               <a:ext uri="{FF2B5EF4-FFF2-40B4-BE49-F238E27FC236}">
-                <a16:creationId xmlns:a16="http://schemas.microsoft.com/office/drawing/2014/main" id="{3C1DF106-4F00-4AE2-9128-0C23044CFF79}"/>
+                <a16:creationId xmlns:a16="http://schemas.microsoft.com/office/drawing/2014/main" id="{635725E4-09A8-4723-96EE-C93CB193F2C0}"/>
               </a:ext>
             </a:extLst>
           </p:cNvPr>
@@ -6609,7 +6536,7 @@
             <a:spLocks noGrp="1"/>
           </p:cNvSpPr>
           <p:nvPr>
-            <p:ph type="ctrTitle"/>
+            <p:ph type="title"/>
           </p:nvPr>
         </p:nvSpPr>
         <p:spPr/>
@@ -6617,10 +6544,83 @@
           <a:bodyPr/>
           <a:lstStyle/>
           <a:p>
-            <a:pPr algn="ctr"/>
             <a:r>
               <a:rPr lang="en-US" dirty="0"/>
-              <a:t>Demo</a:t>
+              <a:t>Functional Requirements</a:t>
+            </a:r>
+          </a:p>
+        </p:txBody>
+      </p:sp>
+      <p:sp>
+        <p:nvSpPr>
+          <p:cNvPr id="3" name="Content Placeholder 2">
+            <a:extLst>
+              <a:ext uri="{FF2B5EF4-FFF2-40B4-BE49-F238E27FC236}">
+                <a16:creationId xmlns:a16="http://schemas.microsoft.com/office/drawing/2014/main" id="{E26F6CD7-834F-49EC-8D3E-9FAC381969FD}"/>
+              </a:ext>
+            </a:extLst>
+          </p:cNvPr>
+          <p:cNvSpPr>
+            <a:spLocks noGrp="1"/>
+          </p:cNvSpPr>
+          <p:nvPr>
+            <p:ph idx="1"/>
+          </p:nvPr>
+        </p:nvSpPr>
+        <p:spPr/>
+        <p:txBody>
+          <a:bodyPr>
+            <a:normAutofit/>
+          </a:bodyPr>
+          <a:lstStyle/>
+          <a:p>
+            <a:pPr>
+              <a:buFont typeface="Arial" panose="020B0604020202020204" pitchFamily="34" charset="0"/>
+              <a:buChar char="•"/>
+            </a:pPr>
+            <a:r>
+              <a:rPr lang="en-US" sz="1800" dirty="0"/>
+              <a:t> Allow the storing and loading of character data for later reference</a:t>
+            </a:r>
+          </a:p>
+          <a:p>
+            <a:pPr>
+              <a:buFont typeface="Arial" panose="020B0604020202020204" pitchFamily="34" charset="0"/>
+              <a:buChar char="•"/>
+            </a:pPr>
+            <a:r>
+              <a:rPr lang="en-US" sz="1800" dirty="0"/>
+              <a:t> Allow for modification of character data</a:t>
+            </a:r>
+          </a:p>
+          <a:p>
+            <a:pPr>
+              <a:buFont typeface="Arial" panose="020B0604020202020204" pitchFamily="34" charset="0"/>
+              <a:buChar char="•"/>
+            </a:pPr>
+            <a:r>
+              <a:rPr lang="en-US" sz="1800" dirty="0"/>
+              <a:t> Allow for the creation of new character data</a:t>
+            </a:r>
+          </a:p>
+          <a:p>
+            <a:pPr>
+              <a:buFont typeface="Arial" panose="020B0604020202020204" pitchFamily="34" charset="0"/>
+              <a:buChar char="•"/>
+            </a:pPr>
+            <a:r>
+              <a:rPr lang="en-US" sz="1800" dirty="0"/>
+              <a:t> Allow for the importing of character data from a standardized PDF</a:t>
+            </a:r>
+          </a:p>
+          <a:p>
+            <a:pPr>
+              <a:buFont typeface="Arial" panose="020B0604020202020204" pitchFamily="34" charset="0"/>
+              <a:buChar char="•"/>
+            </a:pPr>
+            <a:r>
+              <a:rPr lang="en-US" sz="1800" dirty="0"/>
+              <a:t> Allow for the viewing of character data</a:t>
             </a:r>
           </a:p>
         </p:txBody>
@@ -6628,7 +6628,7 @@
     </p:spTree>
     <p:extLst>
       <p:ext uri="{BB962C8B-B14F-4D97-AF65-F5344CB8AC3E}">
-        <p14:creationId xmlns:p14="http://schemas.microsoft.com/office/powerpoint/2010/main" val="140397030"/>
+        <p14:creationId xmlns:p14="http://schemas.microsoft.com/office/powerpoint/2010/main" val="4180510243"/>
       </p:ext>
     </p:extLst>
   </p:cSld>
@@ -6639,7 +6639,7 @@
 </file>
 
 <file path=ppt/slides/slide8.xml><?xml version="1.0" encoding="utf-8"?>
-<p:sld xmlns:a="http://schemas.openxmlformats.org/drawingml/2006/main" xmlns:r="http://schemas.openxmlformats.org/officeDocument/2006/relationships" xmlns:p="http://schemas.openxmlformats.org/presentationml/2006/main" show="0">
+<p:sld xmlns:a="http://schemas.openxmlformats.org/drawingml/2006/main" xmlns:r="http://schemas.openxmlformats.org/officeDocument/2006/relationships" xmlns:p="http://schemas.openxmlformats.org/presentationml/2006/main">
   <p:cSld>
     <p:spTree>
       <p:nvGrpSpPr>
@@ -6764,7 +6764,7 @@
 </file>
 
 <file path=ppt/slides/slide9.xml><?xml version="1.0" encoding="utf-8"?>
-<p:sld xmlns:a="http://schemas.openxmlformats.org/drawingml/2006/main" xmlns:r="http://schemas.openxmlformats.org/officeDocument/2006/relationships" xmlns:p="http://schemas.openxmlformats.org/presentationml/2006/main" show="0">
+<p:sld xmlns:a="http://schemas.openxmlformats.org/drawingml/2006/main" xmlns:r="http://schemas.openxmlformats.org/officeDocument/2006/relationships" xmlns:p="http://schemas.openxmlformats.org/presentationml/2006/main">
   <p:cSld>
     <p:spTree>
       <p:nvGrpSpPr>
@@ -7515,24 +7515,6 @@
 </file>
 
 <file path=customXml/item1.xml><?xml version="1.0" encoding="utf-8"?>
-<p:properties xmlns:p="http://schemas.microsoft.com/office/2006/metadata/properties" xmlns:xsi="http://www.w3.org/2001/XMLSchema-instance" xmlns:pc="http://schemas.microsoft.com/office/infopath/2007/PartnerControls">
-  <documentManagement>
-    <Status xmlns="71af3243-3dd4-4a8d-8c0d-dd76da1f02a5">Not started</Status>
-    <MediaServiceKeyPoints xmlns="71af3243-3dd4-4a8d-8c0d-dd76da1f02a5" xsi:nil="true"/>
-  </documentManagement>
-</p:properties>
-</file>
-
-<file path=customXml/item2.xml><?xml version="1.0" encoding="utf-8"?>
-<?mso-contentType ?>
-<FormTemplates xmlns="http://schemas.microsoft.com/sharepoint/v3/contenttype/forms">
-  <Display>DocumentLibraryForm</Display>
-  <Edit>DocumentLibraryForm</Edit>
-  <New>DocumentLibraryForm</New>
-</FormTemplates>
-</file>
-
-<file path=customXml/item3.xml><?xml version="1.0" encoding="utf-8"?>
 <ct:contentTypeSchema xmlns:ct="http://schemas.microsoft.com/office/2006/metadata/contentType" xmlns:ma="http://schemas.microsoft.com/office/2006/metadata/properties/metaAttributes" ct:_="" ma:_="" ma:contentTypeName="Document" ma:contentTypeID="0x01010079F111ED35F8CC479449609E8A0923A6" ma:contentTypeVersion="12" ma:contentTypeDescription="Create a new document." ma:contentTypeScope="" ma:versionID="426e97fa315356fffbdcd9876fe988c2">
   <xsd:schema xmlns:xsd="http://www.w3.org/2001/XMLSchema" xmlns:xs="http://www.w3.org/2001/XMLSchema" xmlns:p="http://schemas.microsoft.com/office/2006/metadata/properties" xmlns:ns2="71af3243-3dd4-4a8d-8c0d-dd76da1f02a5" xmlns:ns3="16c05727-aa75-4e4a-9b5f-8a80a1165891" targetNamespace="http://schemas.microsoft.com/office/2006/metadata/properties" ma:root="true" ma:fieldsID="14b8f0def80e6d70ce3def20c90759ae" ns2:_="" ns3:_="">
     <xsd:import namespace="71af3243-3dd4-4a8d-8c0d-dd76da1f02a5"/>
@@ -7753,25 +7735,25 @@
 </ct:contentTypeSchema>
 </file>
 
-<file path=customXml/itemProps1.xml><?xml version="1.0" encoding="utf-8"?>
-<ds:datastoreItem xmlns:ds="http://schemas.openxmlformats.org/officeDocument/2006/customXml" ds:itemID="{84F503EC-3FFF-4193-A86F-39150E2BAC75}">
-  <ds:schemaRefs>
-    <ds:schemaRef ds:uri="http://schemas.microsoft.com/office/2006/metadata/properties"/>
-    <ds:schemaRef ds:uri="http://schemas.microsoft.com/office/infopath/2007/PartnerControls"/>
-    <ds:schemaRef ds:uri="71af3243-3dd4-4a8d-8c0d-dd76da1f02a5"/>
-  </ds:schemaRefs>
-</ds:datastoreItem>
+<file path=customXml/item2.xml><?xml version="1.0" encoding="utf-8"?>
+<?mso-contentType ?>
+<FormTemplates xmlns="http://schemas.microsoft.com/sharepoint/v3/contenttype/forms">
+  <Display>DocumentLibraryForm</Display>
+  <Edit>DocumentLibraryForm</Edit>
+  <New>DocumentLibraryForm</New>
+</FormTemplates>
 </file>
 
-<file path=customXml/itemProps2.xml><?xml version="1.0" encoding="utf-8"?>
-<ds:datastoreItem xmlns:ds="http://schemas.openxmlformats.org/officeDocument/2006/customXml" ds:itemID="{2E5ECA37-C458-4BA2-A090-D7A19E07B434}">
-  <ds:schemaRefs>
-    <ds:schemaRef ds:uri="http://schemas.microsoft.com/sharepoint/v3/contenttype/forms"/>
-  </ds:schemaRefs>
-</ds:datastoreItem>
+<file path=customXml/item3.xml><?xml version="1.0" encoding="utf-8"?>
+<p:properties xmlns:p="http://schemas.microsoft.com/office/2006/metadata/properties" xmlns:xsi="http://www.w3.org/2001/XMLSchema-instance" xmlns:pc="http://schemas.microsoft.com/office/infopath/2007/PartnerControls">
+  <documentManagement>
+    <Status xmlns="71af3243-3dd4-4a8d-8c0d-dd76da1f02a5">Not started</Status>
+    <MediaServiceKeyPoints xmlns="71af3243-3dd4-4a8d-8c0d-dd76da1f02a5" xsi:nil="true"/>
+  </documentManagement>
+</p:properties>
 </file>
 
-<file path=customXml/itemProps3.xml><?xml version="1.0" encoding="utf-8"?>
+<file path=customXml/itemProps1.xml><?xml version="1.0" encoding="utf-8"?>
 <ds:datastoreItem xmlns:ds="http://schemas.openxmlformats.org/officeDocument/2006/customXml" ds:itemID="{7A26AAF5-6CFC-4C52-B7DF-08410EDE6701}">
   <ds:schemaRefs>
     <ds:schemaRef ds:uri="http://schemas.microsoft.com/office/2006/metadata/contentType"/>
@@ -7788,4 +7770,29 @@
     <ds:schemaRef ds:uri="http://schemas.microsoft.com/internal/obd"/>
   </ds:schemaRefs>
 </ds:datastoreItem>
+</file>
+
+<file path=customXml/itemProps2.xml><?xml version="1.0" encoding="utf-8"?>
+<ds:datastoreItem xmlns:ds="http://schemas.openxmlformats.org/officeDocument/2006/customXml" ds:itemID="{2E5ECA37-C458-4BA2-A090-D7A19E07B434}">
+  <ds:schemaRefs>
+    <ds:schemaRef ds:uri="http://schemas.microsoft.com/sharepoint/v3/contenttype/forms"/>
+  </ds:schemaRefs>
+</ds:datastoreItem>
+</file>
+
+<file path=customXml/itemProps3.xml><?xml version="1.0" encoding="utf-8"?>
+<ds:datastoreItem xmlns:ds="http://schemas.openxmlformats.org/officeDocument/2006/customXml" ds:itemID="{84F503EC-3FFF-4193-A86F-39150E2BAC75}">
+  <ds:schemaRefs>
+    <ds:schemaRef ds:uri="http://schemas.microsoft.com/office/infopath/2007/PartnerControls"/>
+    <ds:schemaRef ds:uri="http://purl.org/dc/elements/1.1/"/>
+    <ds:schemaRef ds:uri="http://schemas.microsoft.com/office/2006/metadata/properties"/>
+    <ds:schemaRef ds:uri="71af3243-3dd4-4a8d-8c0d-dd76da1f02a5"/>
+    <ds:schemaRef ds:uri="http://purl.org/dc/terms/"/>
+    <ds:schemaRef ds:uri="http://schemas.microsoft.com/office/2006/documentManagement/types"/>
+    <ds:schemaRef ds:uri="http://schemas.openxmlformats.org/package/2006/metadata/core-properties"/>
+    <ds:schemaRef ds:uri="http://purl.org/dc/dcmitype/"/>
+    <ds:schemaRef ds:uri="16c05727-aa75-4e4a-9b5f-8a80a1165891"/>
+    <ds:schemaRef ds:uri="http://www.w3.org/XML/1998/namespace"/>
+  </ds:schemaRefs>
+</ds:datastoreItem>
 </file>
</xml_diff>